<commit_message>
Update Lecture 4 - IBAMR Tutorial_ Boundary Conditions.pptx
small edits
</commit_message>
<xml_diff>
--- a/IBAMR Lectures/Lecture 4 - IBAMR Tutorial_ Boundary Conditions.pptx
+++ b/IBAMR Lectures/Lecture 4 - IBAMR Tutorial_ Boundary Conditions.pptx
@@ -19485,10 +19485,10 @@
               <a:buNone/>
             </a:pPr>
             <a:r>
-              <a:rPr lang="en"/>
+              <a:rPr lang="en" dirty="0"/>
               <a:t>Notation:  if( logical statement, a, b)</a:t>
             </a:r>
-            <a:endParaRPr/>
+            <a:endParaRPr dirty="0"/>
           </a:p>
           <a:p>
             <a:pPr marL="342900" lvl="0" indent="-222250" algn="l" rtl="0">
@@ -19500,7 +19500,7 @@
               </a:spcAft>
               <a:buNone/>
             </a:pPr>
-            <a:endParaRPr sz="1200"/>
+            <a:endParaRPr sz="1200" dirty="0"/>
           </a:p>
           <a:p>
             <a:pPr marL="120650" lvl="0" indent="0" algn="l" rtl="0">
@@ -19513,10 +19513,10 @@
               <a:buNone/>
             </a:pPr>
             <a:r>
-              <a:rPr lang="en" sz="2600"/>
+              <a:rPr lang="en" sz="2600" dirty="0"/>
               <a:t>	-if logical statement is true, do ‘a’</a:t>
             </a:r>
-            <a:endParaRPr sz="2600"/>
+            <a:endParaRPr sz="2600" dirty="0"/>
           </a:p>
           <a:p>
             <a:pPr marL="120650" lvl="0" indent="0" algn="l" rtl="0">
@@ -19529,10 +19529,10 @@
               <a:buNone/>
             </a:pPr>
             <a:r>
-              <a:rPr lang="en" sz="2600"/>
+              <a:rPr lang="en" sz="2600" dirty="0"/>
               <a:t>	-if logical statement is false, do ‘b’</a:t>
             </a:r>
-            <a:endParaRPr sz="2600"/>
+            <a:endParaRPr sz="2600" dirty="0"/>
           </a:p>
           <a:p>
             <a:pPr marL="120650" lvl="0" indent="0" algn="l" rtl="0">
@@ -19544,7 +19544,7 @@
               </a:spcAft>
               <a:buNone/>
             </a:pPr>
-            <a:endParaRPr sz="1200"/>
+            <a:endParaRPr sz="1200" dirty="0"/>
           </a:p>
           <a:p>
             <a:pPr marL="120650" lvl="0" indent="0" algn="l" rtl="0">
@@ -19557,10 +19557,10 @@
               <a:buNone/>
             </a:pPr>
             <a:r>
-              <a:rPr lang="en"/>
+              <a:rPr lang="en" dirty="0"/>
               <a:t>Note: Can used nested in-line if-statements as well, e.g., </a:t>
             </a:r>
-            <a:endParaRPr/>
+            <a:endParaRPr dirty="0"/>
           </a:p>
           <a:p>
             <a:pPr marL="577850" lvl="0" indent="336550" algn="l" rtl="0">
@@ -19573,10 +19573,10 @@
               <a:buNone/>
             </a:pPr>
             <a:r>
-              <a:rPr lang="en" sz="2600"/>
+              <a:rPr lang="en" sz="2600" dirty="0"/>
               <a:t>if (logical statement-1, a, if( logical-statement-2, b, c) )</a:t>
             </a:r>
-            <a:endParaRPr sz="2600"/>
+            <a:endParaRPr sz="2600" dirty="0"/>
           </a:p>
           <a:p>
             <a:pPr marL="577850" lvl="0" indent="336550" algn="l" rtl="0">
@@ -19588,7 +19588,7 @@
               </a:spcAft>
               <a:buNone/>
             </a:pPr>
-            <a:endParaRPr sz="1200"/>
+            <a:endParaRPr sz="1200" dirty="0"/>
           </a:p>
           <a:p>
             <a:pPr marL="0" lvl="0" indent="0" algn="l" rtl="0">
@@ -19601,10 +19601,10 @@
               <a:buNone/>
             </a:pPr>
             <a:r>
-              <a:rPr lang="en" sz="2600"/>
+              <a:rPr lang="en" sz="2600" dirty="0"/>
               <a:t> [if logical-statement-1 is true, do ‘a’, else if logical-statement-2 is true, do ‘b’, else do ‘c’.]</a:t>
             </a:r>
-            <a:endParaRPr sz="2600"/>
+            <a:endParaRPr sz="2600" dirty="0"/>
           </a:p>
         </p:txBody>
       </p:sp>
@@ -20163,10 +20163,10 @@
               <a:buChar char="●"/>
             </a:pPr>
             <a:r>
-              <a:rPr lang="en-US" sz="2400"/>
+              <a:rPr lang="en-US" sz="2400" dirty="0"/>
               <a:t>Look at Example_3DGlycocalyx.zip in the examples folder.</a:t>
             </a:r>
-            <a:endParaRPr sz="2400"/>
+            <a:endParaRPr sz="2400" dirty="0"/>
           </a:p>
           <a:p>
             <a:pPr marL="457200" lvl="0" indent="-381000" algn="l" rtl="0">
@@ -20180,10 +20180,18 @@
               <a:buChar char="●"/>
             </a:pPr>
             <a:r>
-              <a:rPr lang="en-US" sz="2400"/>
-              <a:t>We want to model a periodic array of (fixed) cylinders in channel flow.</a:t>
+              <a:rPr lang="en-US" sz="2400" dirty="0"/>
+              <a:t>We want to model a periodic array of (fixed) cylinders in </a:t>
             </a:r>
-            <a:endParaRPr sz="2400"/>
+            <a:r>
+              <a:rPr lang="en-US" sz="2400" dirty="0" smtClean="0"/>
+              <a:t>shear </a:t>
+            </a:r>
+            <a:r>
+              <a:rPr lang="en-US" sz="2400" dirty="0"/>
+              <a:t>flow.</a:t>
+            </a:r>
+            <a:endParaRPr sz="2400" dirty="0"/>
           </a:p>
           <a:p>
             <a:pPr marL="457200" lvl="0" indent="-381000" algn="l" rtl="0">
@@ -20197,10 +20205,10 @@
               <a:buChar char="●"/>
             </a:pPr>
             <a:r>
-              <a:rPr lang="en-US" sz="2400"/>
+              <a:rPr lang="en-US" sz="2400" dirty="0"/>
               <a:t>Use periodic boundary conditions in two dimensions, no slip on the bottom, and prescribed velocity at the top.</a:t>
             </a:r>
-            <a:endParaRPr sz="2400"/>
+            <a:endParaRPr sz="2400" dirty="0"/>
           </a:p>
           <a:p>
             <a:pPr marL="457200" lvl="0" indent="-381000" algn="l" rtl="0">
@@ -20214,10 +20222,10 @@
               <a:buChar char="●"/>
             </a:pPr>
             <a:r>
-              <a:rPr lang="en-US" sz="2400"/>
+              <a:rPr lang="en-US" sz="2400" dirty="0"/>
               <a:t>The cylinder will be placed in the middle of the domain, coming out of the floor.</a:t>
             </a:r>
-            <a:endParaRPr sz="2400"/>
+            <a:endParaRPr sz="2400" dirty="0"/>
           </a:p>
         </p:txBody>
       </p:sp>
@@ -20394,10 +20402,10 @@
               <a:buNone/>
             </a:pPr>
             <a:r>
-              <a:rPr lang="en-US" sz="1000"/>
+              <a:rPr lang="en-US" sz="1000" dirty="0"/>
               <a:t>VelocityBcCoefs_0 {                       // boundary conditions for the x-component of the velocity</a:t>
             </a:r>
-            <a:endParaRPr sz="1000"/>
+            <a:endParaRPr sz="1000" dirty="0"/>
           </a:p>
           <a:p>
             <a:pPr marL="0" lvl="0" indent="0" algn="l" rtl="0">
@@ -20410,10 +20418,10 @@
               <a:buNone/>
             </a:pPr>
             <a:r>
-              <a:rPr lang="en-US" sz="1000"/>
+              <a:rPr lang="en-US" sz="1000" dirty="0"/>
               <a:t>   acoef_function_0 = "1.0"                //</a:t>
             </a:r>
-            <a:endParaRPr sz="1000"/>
+            <a:endParaRPr sz="1000" dirty="0"/>
           </a:p>
           <a:p>
             <a:pPr marL="0" lvl="0" indent="0" algn="l" rtl="0">
@@ -20426,10 +20434,10 @@
               <a:buNone/>
             </a:pPr>
             <a:r>
-              <a:rPr lang="en-US" sz="1000"/>
+              <a:rPr lang="en-US" sz="1000" dirty="0"/>
               <a:t>   acoef_function_1 = "1.0"                //</a:t>
             </a:r>
-            <a:endParaRPr sz="1000"/>
+            <a:endParaRPr sz="1000" dirty="0"/>
           </a:p>
           <a:p>
             <a:pPr marL="0" lvl="0" indent="0" algn="l" rtl="0">
@@ -20442,10 +20450,10 @@
               <a:buNone/>
             </a:pPr>
             <a:r>
-              <a:rPr lang="en-US" sz="1000"/>
+              <a:rPr lang="en-US" sz="1000" dirty="0"/>
               <a:t>   acoef_function_2 = "1.0"                //</a:t>
             </a:r>
-            <a:endParaRPr sz="1000"/>
+            <a:endParaRPr sz="1000" dirty="0"/>
           </a:p>
           <a:p>
             <a:pPr marL="0" lvl="0" indent="0" algn="l" rtl="0">
@@ -20458,10 +20466,10 @@
               <a:buNone/>
             </a:pPr>
             <a:r>
-              <a:rPr lang="en-US" sz="1000"/>
+              <a:rPr lang="en-US" sz="1000" dirty="0"/>
               <a:t>   acoef_function_3 = "1.0"                //</a:t>
             </a:r>
-            <a:endParaRPr sz="1000"/>
+            <a:endParaRPr sz="1000" dirty="0"/>
           </a:p>
           <a:p>
             <a:pPr marL="0" lvl="0" indent="0" algn="l" rtl="0">
@@ -20474,10 +20482,10 @@
               <a:buNone/>
             </a:pPr>
             <a:r>
-              <a:rPr lang="en-US" sz="1000"/>
+              <a:rPr lang="en-US" sz="1000" dirty="0"/>
               <a:t>   acoef_function_4 = "1.0"                //</a:t>
             </a:r>
-            <a:endParaRPr sz="1000"/>
+            <a:endParaRPr sz="1000" dirty="0"/>
           </a:p>
           <a:p>
             <a:pPr marL="0" lvl="0" indent="0" algn="l" rtl="0">
@@ -20490,10 +20498,10 @@
               <a:buNone/>
             </a:pPr>
             <a:r>
-              <a:rPr lang="en-US" sz="1000"/>
+              <a:rPr lang="en-US" sz="1000" dirty="0"/>
               <a:t>   acoef_function_5 = "1.0"                //</a:t>
             </a:r>
-            <a:endParaRPr sz="1000"/>
+            <a:endParaRPr sz="1000" dirty="0"/>
           </a:p>
           <a:p>
             <a:pPr marL="0" lvl="0" indent="0" algn="l" rtl="0">
@@ -20506,10 +20514,10 @@
               <a:buNone/>
             </a:pPr>
             <a:r>
-              <a:rPr lang="en-US" sz="1000"/>
+              <a:rPr lang="en-US" sz="1000" dirty="0"/>
               <a:t>   //</a:t>
             </a:r>
-            <a:endParaRPr sz="1000"/>
+            <a:endParaRPr sz="1000" dirty="0"/>
           </a:p>
           <a:p>
             <a:pPr marL="0" lvl="0" indent="0" algn="l" rtl="0">
@@ -20522,10 +20530,10 @@
               <a:buNone/>
             </a:pPr>
             <a:r>
-              <a:rPr lang="en-US" sz="1000"/>
+              <a:rPr lang="en-US" sz="1000" dirty="0"/>
               <a:t>   bcoef_function_0 = "0.0"                //</a:t>
             </a:r>
-            <a:endParaRPr sz="1000"/>
+            <a:endParaRPr sz="1000" dirty="0"/>
           </a:p>
           <a:p>
             <a:pPr marL="0" lvl="0" indent="0" algn="l" rtl="0">
@@ -20538,10 +20546,10 @@
               <a:buNone/>
             </a:pPr>
             <a:r>
-              <a:rPr lang="en-US" sz="1000"/>
+              <a:rPr lang="en-US" sz="1000" dirty="0"/>
               <a:t>   bcoef_function_1 = "0.0"                //</a:t>
             </a:r>
-            <a:endParaRPr sz="1000"/>
+            <a:endParaRPr sz="1000" dirty="0"/>
           </a:p>
           <a:p>
             <a:pPr marL="0" lvl="0" indent="0" algn="l" rtl="0">
@@ -20554,10 +20562,10 @@
               <a:buNone/>
             </a:pPr>
             <a:r>
-              <a:rPr lang="en-US" sz="1000"/>
+              <a:rPr lang="en-US" sz="1000" dirty="0"/>
               <a:t>   bcoef_function_2 = "0.0"                //</a:t>
             </a:r>
-            <a:endParaRPr sz="1000"/>
+            <a:endParaRPr sz="1000" dirty="0"/>
           </a:p>
           <a:p>
             <a:pPr marL="0" lvl="0" indent="0" algn="l" rtl="0">
@@ -20570,10 +20578,10 @@
               <a:buNone/>
             </a:pPr>
             <a:r>
-              <a:rPr lang="en-US" sz="1000"/>
+              <a:rPr lang="en-US" sz="1000" dirty="0"/>
               <a:t>   bcoef_function_3 = "0.0"                //</a:t>
             </a:r>
-            <a:endParaRPr sz="1000"/>
+            <a:endParaRPr sz="1000" dirty="0"/>
           </a:p>
           <a:p>
             <a:pPr marL="0" lvl="0" indent="0" algn="l" rtl="0">
@@ -20586,10 +20594,10 @@
               <a:buNone/>
             </a:pPr>
             <a:r>
-              <a:rPr lang="en-US" sz="1000"/>
+              <a:rPr lang="en-US" sz="1000" dirty="0"/>
               <a:t>   bcoef_function_4 = "0.0"                //</a:t>
             </a:r>
-            <a:endParaRPr sz="1000"/>
+            <a:endParaRPr sz="1000" dirty="0"/>
           </a:p>
           <a:p>
             <a:pPr marL="0" lvl="0" indent="0" algn="l" rtl="0">
@@ -20602,10 +20610,10 @@
               <a:buNone/>
             </a:pPr>
             <a:r>
-              <a:rPr lang="en-US" sz="1000"/>
+              <a:rPr lang="en-US" sz="1000" dirty="0"/>
               <a:t>   bcoef_function_5 = "0.0"                //</a:t>
             </a:r>
-            <a:endParaRPr sz="1000"/>
+            <a:endParaRPr sz="1000" dirty="0"/>
           </a:p>
           <a:p>
             <a:pPr marL="0" lvl="0" indent="0" algn="l" rtl="0">
@@ -20618,10 +20626,10 @@
               <a:buNone/>
             </a:pPr>
             <a:r>
-              <a:rPr lang="en-US" sz="1000"/>
+              <a:rPr lang="en-US" sz="1000" dirty="0"/>
               <a:t>   //</a:t>
             </a:r>
-            <a:endParaRPr sz="1000"/>
+            <a:endParaRPr sz="1000" dirty="0"/>
           </a:p>
           <a:p>
             <a:pPr marL="0" lvl="0" indent="0" algn="l" rtl="0">
@@ -20634,10 +20642,10 @@
               <a:buNone/>
             </a:pPr>
             <a:r>
-              <a:rPr lang="en-US" sz="1000"/>
+              <a:rPr lang="en-US" sz="1000" dirty="0"/>
               <a:t>   gcoef_function_0 = "0.0"                //</a:t>
             </a:r>
-            <a:endParaRPr sz="1000"/>
+            <a:endParaRPr sz="1000" dirty="0"/>
           </a:p>
           <a:p>
             <a:pPr marL="0" lvl="0" indent="0" algn="l" rtl="0">
@@ -20650,10 +20658,10 @@
               <a:buNone/>
             </a:pPr>
             <a:r>
-              <a:rPr lang="en-US" sz="1000"/>
+              <a:rPr lang="en-US" sz="1000" dirty="0"/>
               <a:t>   gcoef_function_1 = "0.0"                //</a:t>
             </a:r>
-            <a:endParaRPr sz="1000"/>
+            <a:endParaRPr sz="1000" dirty="0"/>
           </a:p>
           <a:p>
             <a:pPr marL="0" lvl="0" indent="0" algn="l" rtl="0">
@@ -20666,10 +20674,10 @@
               <a:buNone/>
             </a:pPr>
             <a:r>
-              <a:rPr lang="en-US" sz="1000"/>
+              <a:rPr lang="en-US" sz="1000" dirty="0"/>
               <a:t>   gcoef_function_2 = "0.0"                //</a:t>
             </a:r>
-            <a:endParaRPr sz="1000"/>
+            <a:endParaRPr sz="1000" dirty="0"/>
           </a:p>
           <a:p>
             <a:pPr marL="0" lvl="0" indent="0" algn="l" rtl="0">
@@ -20682,10 +20690,10 @@
               <a:buNone/>
             </a:pPr>
             <a:r>
-              <a:rPr lang="en-US" sz="1000"/>
+              <a:rPr lang="en-US" sz="1000" dirty="0"/>
               <a:t>   gcoef_function_3 = "0.0"                //</a:t>
             </a:r>
-            <a:endParaRPr sz="1000"/>
+            <a:endParaRPr sz="1000" dirty="0"/>
           </a:p>
           <a:p>
             <a:pPr marL="0" lvl="0" indent="0" algn="l" rtl="0">
@@ -20698,10 +20706,10 @@
               <a:buNone/>
             </a:pPr>
             <a:r>
-              <a:rPr lang="en-US" sz="1000"/>
+              <a:rPr lang="en-US" sz="1000" dirty="0"/>
               <a:t>   gcoef_function_4 = "0.0"                //</a:t>
             </a:r>
-            <a:endParaRPr sz="1000"/>
+            <a:endParaRPr sz="1000" dirty="0"/>
           </a:p>
           <a:p>
             <a:pPr marL="0" lvl="0" indent="0" algn="l" rtl="0">
@@ -20714,10 +20722,18 @@
               <a:buNone/>
             </a:pPr>
             <a:r>
-              <a:rPr lang="en-US" sz="1000"/>
-              <a:t>   gcoef_function_5 = "0.1*tanh(2*t)"                //</a:t>
+              <a:rPr lang="en-US" sz="1000" dirty="0"/>
+              <a:t>   gcoef_function_5 = "0.1*</a:t>
             </a:r>
-            <a:endParaRPr sz="1000"/>
+            <a:r>
+              <a:rPr lang="en-US" sz="1000" dirty="0" err="1"/>
+              <a:t>tanh</a:t>
+            </a:r>
+            <a:r>
+              <a:rPr lang="en-US" sz="1000" dirty="0"/>
+              <a:t>(2*t)"                //</a:t>
+            </a:r>
+            <a:endParaRPr sz="1000" dirty="0"/>
           </a:p>
           <a:p>
             <a:pPr marL="0" lvl="0" indent="0" algn="l" rtl="0">
@@ -20730,10 +20746,10 @@
               <a:buNone/>
             </a:pPr>
             <a:r>
-              <a:rPr lang="en-US" sz="1000"/>
+              <a:rPr lang="en-US" sz="1000" dirty="0"/>
               <a:t>} //</a:t>
             </a:r>
-            <a:endParaRPr sz="1000"/>
+            <a:endParaRPr sz="1000" dirty="0"/>
           </a:p>
         </p:txBody>
       </p:sp>
@@ -20778,10 +20794,14 @@
               <a:buNone/>
             </a:pPr>
             <a:r>
-              <a:rPr lang="en-US" sz="1200"/>
-              <a:t>CartesianGeometry {                //</a:t>
+              <a:rPr lang="en-US" sz="1200" dirty="0" err="1"/>
+              <a:t>CartesianGeometry</a:t>
             </a:r>
-            <a:endParaRPr sz="1200"/>
+            <a:r>
+              <a:rPr lang="en-US" sz="1200" dirty="0"/>
+              <a:t> {                //</a:t>
+            </a:r>
+            <a:endParaRPr sz="1200" dirty="0"/>
           </a:p>
           <a:p>
             <a:pPr marL="0" lvl="0" indent="0" algn="l" rtl="0">
@@ -20794,70 +20814,102 @@
               <a:buNone/>
             </a:pPr>
             <a:r>
-              <a:rPr lang="en-US" sz="1200"/>
-              <a:t>   domain_boxes = [ (0,0,0) , (N/8 - 1,N/8 - 1,N - 1) ]//</a:t>
-            </a:r>
-            <a:endParaRPr sz="1200"/>
-          </a:p>
-          <a:p>
-            <a:pPr marL="0" lvl="0" indent="0" algn="l" rtl="0">
-              <a:spcBef>
-                <a:spcPts val="0"/>
-              </a:spcBef>
-              <a:spcAft>
-                <a:spcPts val="0"/>
-              </a:spcAft>
-              <a:buNone/>
-            </a:pPr>
-            <a:r>
-              <a:rPr lang="en-US" sz="1200"/>
-              <a:t>   x_lo = -L/16, -L/16, -L/2   // lower end of computational domain.</a:t>
-            </a:r>
-            <a:endParaRPr sz="1200"/>
-          </a:p>
-          <a:p>
-            <a:pPr marL="0" lvl="0" indent="0" algn="l" rtl="0">
-              <a:spcBef>
-                <a:spcPts val="0"/>
-              </a:spcBef>
-              <a:spcAft>
-                <a:spcPts val="0"/>
-              </a:spcAft>
-              <a:buNone/>
-            </a:pPr>
-            <a:r>
-              <a:rPr lang="en-US" sz="1200"/>
-              <a:t>   x_up =  L/16,  L/16, L/2  // upper end of computational domain.</a:t>
-            </a:r>
-            <a:endParaRPr sz="1200"/>
-          </a:p>
-          <a:p>
-            <a:pPr marL="0" lvl="0" indent="0" algn="l" rtl="0">
-              <a:spcBef>
-                <a:spcPts val="0"/>
-              </a:spcBef>
-              <a:spcAft>
-                <a:spcPts val="0"/>
-              </a:spcAft>
-              <a:buNone/>
-            </a:pPr>
-            <a:r>
-              <a:rPr lang="en-US" sz="1200"/>
+              <a:rPr lang="en-US" sz="1200" dirty="0"/>
               <a:t>   </a:t>
             </a:r>
             <a:r>
-              <a:rPr lang="en-US" sz="1200">
-                <a:solidFill>
-                  <a:srgbClr val="FF0000"/>
-                </a:solidFill>
-              </a:rPr>
-              <a:t>periodic_dimension = 1, 1, 0  </a:t>
+              <a:rPr lang="en-US" sz="1200" dirty="0" err="1"/>
+              <a:t>domain_boxes</a:t>
             </a:r>
             <a:r>
-              <a:rPr lang="en-US" sz="1200"/>
+              <a:rPr lang="en-US" sz="1200" dirty="0"/>
+              <a:t> = [ (0,0,0) , (N/8 - 1,N/8 - 1,N - 1) ]//</a:t>
+            </a:r>
+            <a:endParaRPr sz="1200" dirty="0"/>
+          </a:p>
+          <a:p>
+            <a:pPr marL="0" lvl="0" indent="0" algn="l" rtl="0">
+              <a:spcBef>
+                <a:spcPts val="0"/>
+              </a:spcBef>
+              <a:spcAft>
+                <a:spcPts val="0"/>
+              </a:spcAft>
+              <a:buNone/>
+            </a:pPr>
+            <a:r>
+              <a:rPr lang="en-US" sz="1200" dirty="0"/>
+              <a:t>   </a:t>
+            </a:r>
+            <a:r>
+              <a:rPr lang="en-US" sz="1200" dirty="0" err="1"/>
+              <a:t>x_lo</a:t>
+            </a:r>
+            <a:r>
+              <a:rPr lang="en-US" sz="1200" dirty="0"/>
+              <a:t> = -L/16, -L/16, -L/2   // lower end of computational domain.</a:t>
+            </a:r>
+            <a:endParaRPr sz="1200" dirty="0"/>
+          </a:p>
+          <a:p>
+            <a:pPr marL="0" lvl="0" indent="0" algn="l" rtl="0">
+              <a:spcBef>
+                <a:spcPts val="0"/>
+              </a:spcBef>
+              <a:spcAft>
+                <a:spcPts val="0"/>
+              </a:spcAft>
+              <a:buNone/>
+            </a:pPr>
+            <a:r>
+              <a:rPr lang="en-US" sz="1200" dirty="0"/>
+              <a:t>   </a:t>
+            </a:r>
+            <a:r>
+              <a:rPr lang="en-US" sz="1200" dirty="0" err="1"/>
+              <a:t>x_up</a:t>
+            </a:r>
+            <a:r>
+              <a:rPr lang="en-US" sz="1200" dirty="0"/>
+              <a:t> =  L/16,  L/16, L/2  // upper end of computational domain.</a:t>
+            </a:r>
+            <a:endParaRPr sz="1200" dirty="0"/>
+          </a:p>
+          <a:p>
+            <a:pPr marL="0" lvl="0" indent="0" algn="l" rtl="0">
+              <a:spcBef>
+                <a:spcPts val="0"/>
+              </a:spcBef>
+              <a:spcAft>
+                <a:spcPts val="0"/>
+              </a:spcAft>
+              <a:buNone/>
+            </a:pPr>
+            <a:r>
+              <a:rPr lang="en-US" sz="1200" dirty="0"/>
+              <a:t>   </a:t>
+            </a:r>
+            <a:r>
+              <a:rPr lang="en-US" sz="1200" dirty="0" err="1">
+                <a:solidFill>
+                  <a:srgbClr val="FF0000"/>
+                </a:solidFill>
+              </a:rPr>
+              <a:t>periodic_dimension</a:t>
+            </a:r>
+            <a:r>
+              <a:rPr lang="en-US" sz="1200" dirty="0">
+                <a:solidFill>
+                  <a:srgbClr val="FF0000"/>
+                </a:solidFill>
+              </a:rPr>
+              <a:t> = 1, 1, 0  </a:t>
+            </a:r>
+            <a:r>
+              <a:rPr lang="en-US" sz="1200" dirty="0"/>
               <a:t>             //</a:t>
             </a:r>
-            <a:endParaRPr sz="1200"/>
+            <a:endParaRPr sz="1200" dirty="0"/>
           </a:p>
           <a:p>
             <a:pPr marL="0" lvl="0" indent="0" algn="l" rtl="0">
@@ -20870,10 +20922,10 @@
               <a:buNone/>
             </a:pPr>
             <a:r>
-              <a:rPr lang="en-US" sz="1200"/>
+              <a:rPr lang="en-US" sz="1200" dirty="0"/>
               <a:t>} //</a:t>
             </a:r>
-            <a:endParaRPr sz="1200"/>
+            <a:endParaRPr sz="1200" dirty="0"/>
           </a:p>
         </p:txBody>
       </p:sp>
@@ -21732,10 +21784,10 @@
               <a:buNone/>
             </a:pPr>
             <a:r>
-              <a:rPr lang="en-US"/>
+              <a:rPr lang="en-US" dirty="0"/>
               <a:t>MAX_LEVELS = 3                            // maximum number of levels in locally refined grid</a:t>
             </a:r>
-            <a:endParaRPr/>
+            <a:endParaRPr dirty="0"/>
           </a:p>
           <a:p>
             <a:pPr marL="0" lvl="0" indent="0" algn="l" rtl="0">
@@ -21748,10 +21800,10 @@
               <a:buNone/>
             </a:pPr>
             <a:r>
-              <a:rPr lang="en-US"/>
+              <a:rPr lang="en-US" dirty="0"/>
               <a:t>REF_RATIO  = 4                            // refinement ratio between levels</a:t>
             </a:r>
-            <a:endParaRPr/>
+            <a:endParaRPr dirty="0"/>
           </a:p>
         </p:txBody>
       </p:sp>
@@ -24224,7 +24276,7 @@
         </p:nvSpPr>
         <p:spPr>
           <a:xfrm>
-            <a:off x="457200" y="1447800"/>
+            <a:off x="457200" y="1417637"/>
             <a:ext cx="8458200" cy="5078400"/>
           </a:xfrm>
           <a:prstGeom prst="rect">
@@ -24252,7 +24304,7 @@
               <a:buChar char="●"/>
             </a:pPr>
             <a:r>
-              <a:rPr lang="en" sz="2400" b="0" i="0" u="none" strike="noStrike" cap="none">
+              <a:rPr lang="en" sz="2400" b="0" i="0" u="none" strike="noStrike" cap="none" dirty="0">
                 <a:solidFill>
                   <a:schemeClr val="dk1"/>
                 </a:solidFill>
@@ -24263,7 +24315,7 @@
               </a:rPr>
               <a:t> This would result in no slip (v=0) boundary conditions.</a:t>
             </a:r>
-            <a:endParaRPr sz="1800" b="0" i="0" u="none" strike="noStrike" cap="none">
+            <a:endParaRPr sz="1800" b="0" i="0" u="none" strike="noStrike" cap="none" dirty="0">
               <a:solidFill>
                 <a:schemeClr val="dk1"/>
               </a:solidFill>
@@ -24285,7 +24337,7 @@
               <a:buChar char="●"/>
             </a:pPr>
             <a:r>
-              <a:rPr lang="en" sz="2400" b="0" i="0" u="none" strike="noStrike" cap="none">
+              <a:rPr lang="en" sz="2400" b="0" i="0" u="none" strike="noStrike" cap="none" dirty="0">
                 <a:solidFill>
                   <a:schemeClr val="dk1"/>
                 </a:solidFill>
@@ -24297,7 +24349,7 @@
               <a:t> Note that VelocityBcCoefs_0 would set the x-component of velocity. </a:t>
             </a:r>
             <a:r>
-              <a:rPr lang="en" sz="2400">
+              <a:rPr lang="en" sz="2400" dirty="0">
                 <a:solidFill>
                   <a:schemeClr val="dk1"/>
                 </a:solidFill>
@@ -24308,7 +24360,7 @@
               </a:rPr>
               <a:t>The z-component would be 2.</a:t>
             </a:r>
-            <a:endParaRPr sz="1800" b="0" i="0" u="none" strike="noStrike" cap="none">
+            <a:endParaRPr sz="1800" b="0" i="0" u="none" strike="noStrike" cap="none" dirty="0">
               <a:solidFill>
                 <a:schemeClr val="dk1"/>
               </a:solidFill>
@@ -24328,7 +24380,7 @@
               </a:spcAft>
               <a:buNone/>
             </a:pPr>
-            <a:endParaRPr sz="1800" b="0" i="0" u="none" strike="noStrike" cap="none">
+            <a:endParaRPr sz="1800" b="0" i="0" u="none" strike="noStrike" cap="none" dirty="0">
               <a:solidFill>
                 <a:schemeClr val="dk1"/>
               </a:solidFill>
@@ -24349,7 +24401,7 @@
               <a:buNone/>
             </a:pPr>
             <a:r>
-              <a:rPr lang="en" sz="1800" b="0" i="0" u="none" strike="noStrike" cap="none">
+              <a:rPr lang="en" sz="1800" b="0" i="0" u="none" strike="noStrike" cap="none" dirty="0">
                 <a:solidFill>
                   <a:schemeClr val="dk1"/>
                 </a:solidFill>
@@ -24360,7 +24412,7 @@
               </a:rPr>
               <a:t>VelocityBcCoefs_1 {         // boundary conditions for the y-component of the velocity   acoef_function_0 = "1.0"   </a:t>
             </a:r>
-            <a:endParaRPr sz="1800" b="0" i="0" u="none" strike="noStrike" cap="none">
+            <a:endParaRPr sz="1800" b="0" i="0" u="none" strike="noStrike" cap="none" dirty="0">
               <a:solidFill>
                 <a:schemeClr val="dk1"/>
               </a:solidFill>
@@ -24381,7 +24433,7 @@
               <a:buNone/>
             </a:pPr>
             <a:r>
-              <a:rPr lang="en" sz="1800" b="0" i="0" u="none" strike="noStrike" cap="none">
+              <a:rPr lang="en" sz="1800" b="0" i="0" u="none" strike="noStrike" cap="none" dirty="0">
                 <a:solidFill>
                   <a:schemeClr val="dk1"/>
                 </a:solidFill>
@@ -24392,7 +24444,7 @@
               </a:rPr>
               <a:t>acoef_function_1 = "1.0"   </a:t>
             </a:r>
-            <a:endParaRPr sz="1800" b="0" i="0" u="none" strike="noStrike" cap="none">
+            <a:endParaRPr sz="1800" b="0" i="0" u="none" strike="noStrike" cap="none" dirty="0">
               <a:solidFill>
                 <a:schemeClr val="dk1"/>
               </a:solidFill>
@@ -24413,7 +24465,7 @@
               <a:buNone/>
             </a:pPr>
             <a:r>
-              <a:rPr lang="en" sz="1800" b="0" i="0" u="none" strike="noStrike" cap="none">
+              <a:rPr lang="en" sz="1800" b="0" i="0" u="none" strike="noStrike" cap="none" dirty="0">
                 <a:solidFill>
                   <a:schemeClr val="dk1"/>
                 </a:solidFill>
@@ -24424,7 +24476,7 @@
               </a:rPr>
               <a:t>acoef_function_2 = "1.0"  </a:t>
             </a:r>
-            <a:endParaRPr sz="1800" b="0" i="0" u="none" strike="noStrike" cap="none">
+            <a:endParaRPr sz="1800" b="0" i="0" u="none" strike="noStrike" cap="none" dirty="0">
               <a:solidFill>
                 <a:schemeClr val="dk1"/>
               </a:solidFill>
@@ -24445,7 +24497,7 @@
               <a:buNone/>
             </a:pPr>
             <a:r>
-              <a:rPr lang="en" sz="1800" b="0" i="0" u="none" strike="noStrike" cap="none">
+              <a:rPr lang="en" sz="1800" b="0" i="0" u="none" strike="noStrike" cap="none" dirty="0">
                 <a:solidFill>
                   <a:schemeClr val="dk1"/>
                 </a:solidFill>
@@ -24456,7 +24508,7 @@
               </a:rPr>
               <a:t>acoef_function_3 = "1.0"   </a:t>
             </a:r>
-            <a:endParaRPr sz="1800" b="0" i="0" u="none" strike="noStrike" cap="none">
+            <a:endParaRPr sz="1800" b="0" i="0" u="none" strike="noStrike" cap="none" dirty="0">
               <a:solidFill>
                 <a:schemeClr val="dk1"/>
               </a:solidFill>
@@ -24477,7 +24529,7 @@
               <a:buNone/>
             </a:pPr>
             <a:r>
-              <a:rPr lang="en" sz="1800" b="0" i="0" u="none" strike="noStrike" cap="none">
+              <a:rPr lang="en" sz="1800" b="0" i="0" u="none" strike="noStrike" cap="none" dirty="0">
                 <a:solidFill>
                   <a:schemeClr val="dk1"/>
                 </a:solidFill>
@@ -24488,7 +24540,7 @@
               </a:rPr>
               <a:t>bcoef_function_0 = "0.0"   </a:t>
             </a:r>
-            <a:endParaRPr sz="1800" b="0" i="0" u="none" strike="noStrike" cap="none">
+            <a:endParaRPr sz="1800" b="0" i="0" u="none" strike="noStrike" cap="none" dirty="0">
               <a:solidFill>
                 <a:schemeClr val="dk1"/>
               </a:solidFill>
@@ -24509,7 +24561,7 @@
               <a:buNone/>
             </a:pPr>
             <a:r>
-              <a:rPr lang="en" sz="1800" b="0" i="0" u="none" strike="noStrike" cap="none">
+              <a:rPr lang="en" sz="1800" b="0" i="0" u="none" strike="noStrike" cap="none" dirty="0">
                 <a:solidFill>
                   <a:schemeClr val="dk1"/>
                 </a:solidFill>
@@ -24520,7 +24572,7 @@
               </a:rPr>
               <a:t>bcoef_function_1 = "0.0"   </a:t>
             </a:r>
-            <a:endParaRPr sz="1800" b="0" i="0" u="none" strike="noStrike" cap="none">
+            <a:endParaRPr sz="1800" b="0" i="0" u="none" strike="noStrike" cap="none" dirty="0">
               <a:solidFill>
                 <a:schemeClr val="dk1"/>
               </a:solidFill>
@@ -24541,7 +24593,7 @@
               <a:buNone/>
             </a:pPr>
             <a:r>
-              <a:rPr lang="en" sz="1800" b="0" i="0" u="none" strike="noStrike" cap="none">
+              <a:rPr lang="en" sz="1800" b="0" i="0" u="none" strike="noStrike" cap="none" dirty="0">
                 <a:solidFill>
                   <a:schemeClr val="dk1"/>
                 </a:solidFill>
@@ -24552,7 +24604,7 @@
               </a:rPr>
               <a:t>bcoef_function_2 = "0.0"   </a:t>
             </a:r>
-            <a:endParaRPr sz="1800" b="0" i="0" u="none" strike="noStrike" cap="none">
+            <a:endParaRPr sz="1800" b="0" i="0" u="none" strike="noStrike" cap="none" dirty="0">
               <a:solidFill>
                 <a:schemeClr val="dk1"/>
               </a:solidFill>
@@ -24573,7 +24625,7 @@
               <a:buNone/>
             </a:pPr>
             <a:r>
-              <a:rPr lang="en" sz="1800" b="0" i="0" u="none" strike="noStrike" cap="none">
+              <a:rPr lang="en" sz="1800" b="0" i="0" u="none" strike="noStrike" cap="none" dirty="0">
                 <a:solidFill>
                   <a:schemeClr val="dk1"/>
                 </a:solidFill>
@@ -24584,7 +24636,7 @@
               </a:rPr>
               <a:t>bcoef_function_3 = "0.0"   </a:t>
             </a:r>
-            <a:endParaRPr sz="1800" b="0" i="0" u="none" strike="noStrike" cap="none">
+            <a:endParaRPr sz="1800" b="0" i="0" u="none" strike="noStrike" cap="none" dirty="0">
               <a:solidFill>
                 <a:schemeClr val="dk1"/>
               </a:solidFill>
@@ -24605,7 +24657,7 @@
               <a:buNone/>
             </a:pPr>
             <a:r>
-              <a:rPr lang="en" sz="1800" b="0" i="0" u="none" strike="noStrike" cap="none">
+              <a:rPr lang="en" sz="1800" b="0" i="0" u="none" strike="noStrike" cap="none" dirty="0">
                 <a:solidFill>
                   <a:schemeClr val="dk1"/>
                 </a:solidFill>
@@ -24616,7 +24668,7 @@
               </a:rPr>
               <a:t>gcoef_function_0 = "0.0"   </a:t>
             </a:r>
-            <a:endParaRPr sz="1800" b="0" i="0" u="none" strike="noStrike" cap="none">
+            <a:endParaRPr sz="1800" b="0" i="0" u="none" strike="noStrike" cap="none" dirty="0">
               <a:solidFill>
                 <a:schemeClr val="dk1"/>
               </a:solidFill>
@@ -24637,7 +24689,7 @@
               <a:buNone/>
             </a:pPr>
             <a:r>
-              <a:rPr lang="en" sz="1800" b="0" i="0" u="none" strike="noStrike" cap="none">
+              <a:rPr lang="en" sz="1800" b="0" i="0" u="none" strike="noStrike" cap="none" dirty="0">
                 <a:solidFill>
                   <a:schemeClr val="dk1"/>
                 </a:solidFill>
@@ -24648,7 +24700,7 @@
               </a:rPr>
               <a:t>gcoef_function_1 = "0.0"   </a:t>
             </a:r>
-            <a:endParaRPr sz="1800" b="0" i="0" u="none" strike="noStrike" cap="none">
+            <a:endParaRPr sz="1800" b="0" i="0" u="none" strike="noStrike" cap="none" dirty="0">
               <a:solidFill>
                 <a:schemeClr val="dk1"/>
               </a:solidFill>
@@ -24669,7 +24721,7 @@
               <a:buNone/>
             </a:pPr>
             <a:r>
-              <a:rPr lang="en" sz="1800" b="0" i="0" u="none" strike="noStrike" cap="none">
+              <a:rPr lang="en" sz="1800" b="0" i="0" u="none" strike="noStrike" cap="none" dirty="0">
                 <a:solidFill>
                   <a:schemeClr val="dk1"/>
                 </a:solidFill>
@@ -24680,7 +24732,7 @@
               </a:rPr>
               <a:t>gcoef_function_2 = "0.0"   </a:t>
             </a:r>
-            <a:endParaRPr sz="1800" b="0" i="0" u="none" strike="noStrike" cap="none">
+            <a:endParaRPr sz="1800" b="0" i="0" u="none" strike="noStrike" cap="none" dirty="0">
               <a:solidFill>
                 <a:schemeClr val="dk1"/>
               </a:solidFill>
@@ -24701,7 +24753,7 @@
               <a:buNone/>
             </a:pPr>
             <a:r>
-              <a:rPr lang="en" sz="1800" b="0" i="0" u="none" strike="noStrike" cap="none">
+              <a:rPr lang="en" sz="1800" b="0" i="0" u="none" strike="noStrike" cap="none" dirty="0">
                 <a:solidFill>
                   <a:schemeClr val="dk1"/>
                 </a:solidFill>
@@ -24712,7 +24764,7 @@
               </a:rPr>
               <a:t>gcoef_function_3 = "0.0"}</a:t>
             </a:r>
-            <a:endParaRPr sz="1800" b="0" i="0" u="none" strike="noStrike" cap="none">
+            <a:endParaRPr sz="1800" b="0" i="0" u="none" strike="noStrike" cap="none" dirty="0">
               <a:solidFill>
                 <a:schemeClr val="dk1"/>
               </a:solidFill>
@@ -25164,7 +25216,7 @@
               <a:buNone/>
             </a:pPr>
             <a:r>
-              <a:rPr lang="en" sz="1800" b="0" i="0" u="none" strike="noStrike" cap="none">
+              <a:rPr lang="en" sz="1800" b="0" i="0" u="none" strike="noStrike" cap="none" dirty="0">
                 <a:solidFill>
                   <a:schemeClr val="dk1"/>
                 </a:solidFill>
@@ -25175,7 +25227,7 @@
               </a:rPr>
               <a:t>CartesianGeometry {   </a:t>
             </a:r>
-            <a:endParaRPr sz="1800" b="0" i="0" u="none" strike="noStrike" cap="none">
+            <a:endParaRPr sz="1800" b="0" i="0" u="none" strike="noStrike" cap="none" dirty="0">
               <a:solidFill>
                 <a:schemeClr val="dk1"/>
               </a:solidFill>
@@ -25200,7 +25252,7 @@
               <a:buNone/>
             </a:pPr>
             <a:r>
-              <a:rPr lang="en" sz="1800" b="0" i="0" u="none" strike="noStrike" cap="none">
+              <a:rPr lang="en" sz="1800" b="0" i="0" u="none" strike="noStrike" cap="none" dirty="0">
                 <a:solidFill>
                   <a:schemeClr val="dk1"/>
                 </a:solidFill>
@@ -25211,7 +25263,7 @@
               </a:rPr>
               <a:t>domain_boxes = [ (0,0) , (N - 1,N - 1) ]   </a:t>
             </a:r>
-            <a:endParaRPr sz="1800" b="0" i="0" u="none" strike="noStrike" cap="none">
+            <a:endParaRPr sz="1800" b="0" i="0" u="none" strike="noStrike" cap="none" dirty="0">
               <a:solidFill>
                 <a:schemeClr val="dk1"/>
               </a:solidFill>
@@ -25236,7 +25288,7 @@
               <a:buNone/>
             </a:pPr>
             <a:r>
-              <a:rPr lang="en" sz="1800" b="0" i="0" u="none" strike="noStrike" cap="none">
+              <a:rPr lang="en" sz="1800" b="0" i="0" u="none" strike="noStrike" cap="none" dirty="0">
                 <a:solidFill>
                   <a:schemeClr val="dk1"/>
                 </a:solidFill>
@@ -25247,7 +25299,7 @@
               </a:rPr>
               <a:t>x_lo = -0.5*L, -0.5*L  </a:t>
             </a:r>
-            <a:endParaRPr sz="1800" b="0" i="0" u="none" strike="noStrike" cap="none">
+            <a:endParaRPr sz="1800" b="0" i="0" u="none" strike="noStrike" cap="none" dirty="0">
               <a:solidFill>
                 <a:schemeClr val="dk1"/>
               </a:solidFill>
@@ -25272,7 +25324,7 @@
               <a:buNone/>
             </a:pPr>
             <a:r>
-              <a:rPr lang="en" sz="1800" b="0" i="0" u="none" strike="noStrike" cap="none">
+              <a:rPr lang="en" sz="1800" b="0" i="0" u="none" strike="noStrike" cap="none" dirty="0">
                 <a:solidFill>
                   <a:schemeClr val="dk1"/>
                 </a:solidFill>
@@ -25283,7 +25335,7 @@
               </a:rPr>
               <a:t>// lower end of computational domain.   </a:t>
             </a:r>
-            <a:endParaRPr sz="1800" b="0" i="0" u="none" strike="noStrike" cap="none">
+            <a:endParaRPr sz="1800" b="0" i="0" u="none" strike="noStrike" cap="none" dirty="0">
               <a:solidFill>
                 <a:schemeClr val="dk1"/>
               </a:solidFill>
@@ -25308,7 +25360,7 @@
               <a:buNone/>
             </a:pPr>
             <a:r>
-              <a:rPr lang="en" sz="1800" b="0" i="0" u="none" strike="noStrike" cap="none">
+              <a:rPr lang="en" sz="1800" b="0" i="0" u="none" strike="noStrike" cap="none" dirty="0">
                 <a:solidFill>
                   <a:schemeClr val="dk1"/>
                 </a:solidFill>
@@ -25319,7 +25371,7 @@
               </a:rPr>
               <a:t>x_up =  0.5*L,  0.5*L  </a:t>
             </a:r>
-            <a:endParaRPr sz="1800" b="0" i="0" u="none" strike="noStrike" cap="none">
+            <a:endParaRPr sz="1800" b="0" i="0" u="none" strike="noStrike" cap="none" dirty="0">
               <a:solidFill>
                 <a:schemeClr val="dk1"/>
               </a:solidFill>
@@ -25344,7 +25396,7 @@
               <a:buNone/>
             </a:pPr>
             <a:r>
-              <a:rPr lang="en" sz="1800" b="0" i="0" u="none" strike="noStrike" cap="none">
+              <a:rPr lang="en" sz="1800" b="0" i="0" u="none" strike="noStrike" cap="none" dirty="0">
                 <a:solidFill>
                   <a:schemeClr val="dk1"/>
                 </a:solidFill>
@@ -25355,7 +25407,7 @@
               </a:rPr>
               <a:t>// upper end of computational domain.   </a:t>
             </a:r>
-            <a:endParaRPr sz="1800" b="0" i="0" u="none" strike="noStrike" cap="none">
+            <a:endParaRPr sz="1800" b="0" i="0" u="none" strike="noStrike" cap="none" dirty="0">
               <a:solidFill>
                 <a:schemeClr val="dk1"/>
               </a:solidFill>
@@ -25380,7 +25432,7 @@
               <a:buNone/>
             </a:pPr>
             <a:r>
-              <a:rPr lang="en" sz="1800" b="0" i="0" u="none" strike="noStrike" cap="none">
+              <a:rPr lang="en" sz="1800" b="0" i="0" u="none" strike="noStrike" cap="none" dirty="0">
                 <a:solidFill>
                   <a:schemeClr val="dk1"/>
                 </a:solidFill>
@@ -25391,7 +25443,7 @@
               </a:rPr>
               <a:t>periodic_dimension = 1, 1}</a:t>
             </a:r>
-            <a:endParaRPr sz="1800" b="0" i="0" u="none" strike="noStrike" cap="none">
+            <a:endParaRPr sz="1800" b="0" i="0" u="none" strike="noStrike" cap="none" dirty="0">
               <a:solidFill>
                 <a:schemeClr val="dk1"/>
               </a:solidFill>
@@ -25819,6 +25871,18 @@
           </a:bodyPr>
           <a:lstStyle/>
           <a:p>
+            <a:pPr lvl="0"/>
+            <a:r>
+              <a:rPr lang="en" dirty="0" smtClean="0"/>
+              <a:t>Look at </a:t>
+            </a:r>
+            <a:r>
+              <a:rPr lang="en-US" dirty="0"/>
+              <a:t>4-Example_2DPulsatileChannelFlow</a:t>
+            </a:r>
+            <a:endParaRPr lang="en" dirty="0"/>
+          </a:p>
+          <a:p>
             <a:pPr marL="457200" lvl="0" indent="-317500" algn="l" rtl="0">
               <a:spcBef>
                 <a:spcPts val="640"/>
@@ -25830,10 +25894,14 @@
               <a:buChar char="●"/>
             </a:pPr>
             <a:r>
-              <a:rPr lang="en"/>
-              <a:t>IBAMR is capable of time-dependent and spatially dependent boundary conditions.</a:t>
+              <a:rPr lang="en" dirty="0" smtClean="0"/>
+              <a:t>IBAMR </a:t>
             </a:r>
-            <a:endParaRPr/>
+            <a:r>
+              <a:rPr lang="en" dirty="0"/>
+              <a:t>is capable of time-dependent and spatially dependent boundary conditions.</a:t>
+            </a:r>
+            <a:endParaRPr dirty="0"/>
           </a:p>
           <a:p>
             <a:pPr marL="914400" lvl="1" indent="-317500" algn="l" rtl="0">
@@ -25850,10 +25918,10 @@
               <a:buChar char="○"/>
             </a:pPr>
             <a:r>
-              <a:rPr lang="en"/>
+              <a:rPr lang="en" dirty="0"/>
               <a:t>In ‘input2d’: under VelocityBcCoefs_0(or 1) { //</a:t>
             </a:r>
-            <a:endParaRPr/>
+            <a:endParaRPr dirty="0"/>
           </a:p>
           <a:p>
             <a:pPr marL="1371600" lvl="2" indent="-317500" algn="l" rtl="0">
@@ -25870,10 +25938,10 @@
               <a:buChar char="■"/>
             </a:pPr>
             <a:r>
-              <a:rPr lang="en"/>
+              <a:rPr lang="en" dirty="0"/>
               <a:t>In any of the coefficients, you can use the variable ‘t’ for any time-dependence</a:t>
             </a:r>
-            <a:endParaRPr/>
+            <a:endParaRPr dirty="0"/>
           </a:p>
           <a:p>
             <a:pPr marL="1371600" lvl="2" indent="-317500" algn="l" rtl="0">
@@ -25890,10 +25958,10 @@
               <a:buChar char="■"/>
             </a:pPr>
             <a:r>
-              <a:rPr lang="en"/>
+              <a:rPr lang="en" dirty="0"/>
               <a:t>You can use X_0, X_1, or X_2 for x,y or z respectively.</a:t>
             </a:r>
-            <a:endParaRPr/>
+            <a:endParaRPr dirty="0"/>
           </a:p>
           <a:p>
             <a:pPr marL="1371600" lvl="2" indent="-317500" algn="l" rtl="0">
@@ -25910,10 +25978,10 @@
               <a:buChar char="■"/>
             </a:pPr>
             <a:r>
-              <a:rPr lang="en"/>
+              <a:rPr lang="en" dirty="0"/>
               <a:t>You can use inline “if-statements” for specifying boundary conditions like “if x is less than 5, then u = 2, else u = 0” </a:t>
             </a:r>
-            <a:endParaRPr/>
+            <a:endParaRPr dirty="0"/>
           </a:p>
         </p:txBody>
       </p:sp>

</xml_diff>

<commit_message>
some changes to lecture
</commit_message>
<xml_diff>
--- a/IBAMR Lectures/Lecture 4 - IBAMR Tutorial_ Boundary Conditions.pptx
+++ b/IBAMR Lectures/Lecture 4 - IBAMR Tutorial_ Boundary Conditions.pptx
@@ -7,32 +7,33 @@
     <p:sldMasterId id="2147483678" r:id="rId3"/>
   </p:sldMasterIdLst>
   <p:notesMasterIdLst>
-    <p:notesMasterId r:id="rId27"/>
+    <p:notesMasterId r:id="rId28"/>
   </p:notesMasterIdLst>
   <p:sldIdLst>
     <p:sldId id="256" r:id="rId4"/>
-    <p:sldId id="257" r:id="rId5"/>
-    <p:sldId id="258" r:id="rId6"/>
-    <p:sldId id="259" r:id="rId7"/>
-    <p:sldId id="260" r:id="rId8"/>
-    <p:sldId id="261" r:id="rId9"/>
-    <p:sldId id="262" r:id="rId10"/>
-    <p:sldId id="263" r:id="rId11"/>
-    <p:sldId id="264" r:id="rId12"/>
-    <p:sldId id="265" r:id="rId13"/>
-    <p:sldId id="266" r:id="rId14"/>
-    <p:sldId id="267" r:id="rId15"/>
-    <p:sldId id="268" r:id="rId16"/>
-    <p:sldId id="269" r:id="rId17"/>
-    <p:sldId id="270" r:id="rId18"/>
-    <p:sldId id="271" r:id="rId19"/>
-    <p:sldId id="272" r:id="rId20"/>
-    <p:sldId id="273" r:id="rId21"/>
-    <p:sldId id="274" r:id="rId22"/>
-    <p:sldId id="275" r:id="rId23"/>
-    <p:sldId id="276" r:id="rId24"/>
-    <p:sldId id="277" r:id="rId25"/>
-    <p:sldId id="278" r:id="rId26"/>
+    <p:sldId id="279" r:id="rId5"/>
+    <p:sldId id="257" r:id="rId6"/>
+    <p:sldId id="258" r:id="rId7"/>
+    <p:sldId id="259" r:id="rId8"/>
+    <p:sldId id="260" r:id="rId9"/>
+    <p:sldId id="261" r:id="rId10"/>
+    <p:sldId id="262" r:id="rId11"/>
+    <p:sldId id="263" r:id="rId12"/>
+    <p:sldId id="264" r:id="rId13"/>
+    <p:sldId id="265" r:id="rId14"/>
+    <p:sldId id="266" r:id="rId15"/>
+    <p:sldId id="267" r:id="rId16"/>
+    <p:sldId id="268" r:id="rId17"/>
+    <p:sldId id="269" r:id="rId18"/>
+    <p:sldId id="270" r:id="rId19"/>
+    <p:sldId id="271" r:id="rId20"/>
+    <p:sldId id="272" r:id="rId21"/>
+    <p:sldId id="273" r:id="rId22"/>
+    <p:sldId id="274" r:id="rId23"/>
+    <p:sldId id="275" r:id="rId24"/>
+    <p:sldId id="276" r:id="rId25"/>
+    <p:sldId id="277" r:id="rId26"/>
+    <p:sldId id="278" r:id="rId27"/>
   </p:sldIdLst>
   <p:sldSz cx="9144000" cy="6858000" type="screen4x3"/>
   <p:notesSz cx="6858000" cy="9144000"/>
@@ -19396,6 +19397,208 @@
   <p:cSld>
     <p:spTree>
       <p:nvGrpSpPr>
+        <p:cNvPr id="1" name="Shape 163"/>
+        <p:cNvGrpSpPr/>
+        <p:nvPr/>
+      </p:nvGrpSpPr>
+      <p:grpSpPr>
+        <a:xfrm>
+          <a:off x="0" y="0"/>
+          <a:ext cx="0" cy="0"/>
+          <a:chOff x="0" y="0"/>
+          <a:chExt cx="0" cy="0"/>
+        </a:xfrm>
+      </p:grpSpPr>
+      <p:sp>
+        <p:nvSpPr>
+          <p:cNvPr id="164" name="Google Shape;164;p40"/>
+          <p:cNvSpPr txBox="1">
+            <a:spLocks noGrp="1"/>
+          </p:cNvSpPr>
+          <p:nvPr>
+            <p:ph type="title"/>
+          </p:nvPr>
+        </p:nvSpPr>
+        <p:spPr>
+          <a:xfrm>
+            <a:off x="457200" y="274637"/>
+            <a:ext cx="8229600" cy="1143000"/>
+          </a:xfrm>
+          <a:prstGeom prst="rect">
+            <a:avLst/>
+          </a:prstGeom>
+        </p:spPr>
+        <p:txBody>
+          <a:bodyPr spcFirstLastPara="1" wrap="square" lIns="91425" tIns="91425" rIns="91425" bIns="91425" anchor="t" anchorCtr="0">
+            <a:noAutofit/>
+          </a:bodyPr>
+          <a:lstStyle/>
+          <a:p>
+            <a:pPr marL="0" lvl="0" indent="0" algn="ctr" rtl="0">
+              <a:spcBef>
+                <a:spcPts val="0"/>
+              </a:spcBef>
+              <a:spcAft>
+                <a:spcPts val="0"/>
+              </a:spcAft>
+              <a:buNone/>
+            </a:pPr>
+            <a:r>
+              <a:rPr lang="en"/>
+              <a:t>Spatially and Time-Dependent Boundary Conditions</a:t>
+            </a:r>
+            <a:endParaRPr/>
+          </a:p>
+        </p:txBody>
+      </p:sp>
+      <p:sp>
+        <p:nvSpPr>
+          <p:cNvPr id="165" name="Google Shape;165;p40"/>
+          <p:cNvSpPr txBox="1">
+            <a:spLocks noGrp="1"/>
+          </p:cNvSpPr>
+          <p:nvPr>
+            <p:ph type="body" idx="1"/>
+          </p:nvPr>
+        </p:nvSpPr>
+        <p:spPr>
+          <a:xfrm>
+            <a:off x="457200" y="1706800"/>
+            <a:ext cx="8229600" cy="4526100"/>
+          </a:xfrm>
+          <a:prstGeom prst="rect">
+            <a:avLst/>
+          </a:prstGeom>
+        </p:spPr>
+        <p:txBody>
+          <a:bodyPr spcFirstLastPara="1" wrap="square" lIns="91425" tIns="91425" rIns="91425" bIns="91425" anchor="t" anchorCtr="0">
+            <a:noAutofit/>
+          </a:bodyPr>
+          <a:lstStyle/>
+          <a:p>
+            <a:pPr lvl="0"/>
+            <a:r>
+              <a:rPr lang="en" dirty="0"/>
+              <a:t>Look at </a:t>
+            </a:r>
+            <a:r>
+              <a:rPr lang="en-US" dirty="0"/>
+              <a:t>4-Example_2DPulsatileChannelFlow</a:t>
+            </a:r>
+            <a:endParaRPr lang="en" dirty="0"/>
+          </a:p>
+          <a:p>
+            <a:pPr marL="457200" lvl="0" indent="-317500" algn="l" rtl="0">
+              <a:spcBef>
+                <a:spcPts val="640"/>
+              </a:spcBef>
+              <a:spcAft>
+                <a:spcPts val="0"/>
+              </a:spcAft>
+              <a:buSzPts val="1400"/>
+              <a:buChar char="●"/>
+            </a:pPr>
+            <a:r>
+              <a:rPr lang="en" dirty="0"/>
+              <a:t>IBAMR is capable of time-dependent and spatially dependent boundary conditions.</a:t>
+            </a:r>
+            <a:endParaRPr dirty="0"/>
+          </a:p>
+          <a:p>
+            <a:pPr marL="914400" lvl="1" indent="-317500" algn="l" rtl="0">
+              <a:lnSpc>
+                <a:spcPct val="115000"/>
+              </a:lnSpc>
+              <a:spcBef>
+                <a:spcPts val="0"/>
+              </a:spcBef>
+              <a:spcAft>
+                <a:spcPts val="0"/>
+              </a:spcAft>
+              <a:buSzPts val="1400"/>
+              <a:buChar char="○"/>
+            </a:pPr>
+            <a:r>
+              <a:rPr lang="en" dirty="0"/>
+              <a:t>In ‘input2d’: under VelocityBcCoefs_0(or 1) { //</a:t>
+            </a:r>
+            <a:endParaRPr dirty="0"/>
+          </a:p>
+          <a:p>
+            <a:pPr marL="1371600" lvl="2" indent="-317500" algn="l" rtl="0">
+              <a:lnSpc>
+                <a:spcPct val="115000"/>
+              </a:lnSpc>
+              <a:spcBef>
+                <a:spcPts val="0"/>
+              </a:spcBef>
+              <a:spcAft>
+                <a:spcPts val="0"/>
+              </a:spcAft>
+              <a:buSzPts val="1400"/>
+              <a:buChar char="■"/>
+            </a:pPr>
+            <a:r>
+              <a:rPr lang="en" dirty="0"/>
+              <a:t>In any of the coefficients, you can use the variable ‘t’ for any time-dependence</a:t>
+            </a:r>
+            <a:endParaRPr dirty="0"/>
+          </a:p>
+          <a:p>
+            <a:pPr marL="1371600" lvl="2" indent="-317500" algn="l" rtl="0">
+              <a:lnSpc>
+                <a:spcPct val="115000"/>
+              </a:lnSpc>
+              <a:spcBef>
+                <a:spcPts val="0"/>
+              </a:spcBef>
+              <a:spcAft>
+                <a:spcPts val="0"/>
+              </a:spcAft>
+              <a:buSzPts val="1400"/>
+              <a:buChar char="■"/>
+            </a:pPr>
+            <a:r>
+              <a:rPr lang="en" dirty="0"/>
+              <a:t>You can use X_0, X_1, or X_2 for x,y or z respectively.</a:t>
+            </a:r>
+            <a:endParaRPr dirty="0"/>
+          </a:p>
+          <a:p>
+            <a:pPr marL="1371600" lvl="2" indent="-317500" algn="l" rtl="0">
+              <a:lnSpc>
+                <a:spcPct val="115000"/>
+              </a:lnSpc>
+              <a:spcBef>
+                <a:spcPts val="0"/>
+              </a:spcBef>
+              <a:spcAft>
+                <a:spcPts val="0"/>
+              </a:spcAft>
+              <a:buSzPts val="1400"/>
+              <a:buChar char="■"/>
+            </a:pPr>
+            <a:r>
+              <a:rPr lang="en" dirty="0"/>
+              <a:t>You can use inline “if-statements” for specifying boundary conditions like “if x is less than 5, then u = 2, else u = 0” </a:t>
+            </a:r>
+            <a:endParaRPr dirty="0"/>
+          </a:p>
+        </p:txBody>
+      </p:sp>
+    </p:spTree>
+  </p:cSld>
+  <p:clrMapOvr>
+    <a:masterClrMapping/>
+  </p:clrMapOvr>
+</p:sld>
+</file>
+
+<file path=ppt/slides/slide11.xml><?xml version="1.0" encoding="utf-8"?>
+<p:sld xmlns:a="http://schemas.openxmlformats.org/drawingml/2006/main" xmlns:r="http://schemas.openxmlformats.org/officeDocument/2006/relationships" xmlns:p="http://schemas.openxmlformats.org/presentationml/2006/main">
+  <p:cSld>
+    <p:spTree>
+      <p:nvGrpSpPr>
         <p:cNvPr id="1" name="Shape 169"/>
         <p:cNvGrpSpPr/>
         <p:nvPr/>
@@ -19616,7 +19819,7 @@
 </p:sld>
 </file>
 
-<file path=ppt/slides/slide11.xml><?xml version="1.0" encoding="utf-8"?>
+<file path=ppt/slides/slide12.xml><?xml version="1.0" encoding="utf-8"?>
 <p:sld xmlns:a="http://schemas.openxmlformats.org/drawingml/2006/main" xmlns:r="http://schemas.openxmlformats.org/officeDocument/2006/relationships" xmlns:p="http://schemas.openxmlformats.org/presentationml/2006/main">
   <p:cSld>
     <p:spTree>
@@ -19771,7 +19974,7 @@
 </p:sld>
 </file>
 
-<file path=ppt/slides/slide12.xml><?xml version="1.0" encoding="utf-8"?>
+<file path=ppt/slides/slide13.xml><?xml version="1.0" encoding="utf-8"?>
 <p:sld xmlns:a="http://schemas.openxmlformats.org/drawingml/2006/main" xmlns:r="http://schemas.openxmlformats.org/officeDocument/2006/relationships" xmlns:p="http://schemas.openxmlformats.org/presentationml/2006/main">
   <p:cSld>
     <p:spTree>
@@ -19867,17 +20070,13 @@
             </a:pPr>
             <a:r>
               <a:rPr lang="en" sz="2800" dirty="0"/>
-              <a:t>This is done by setting the appropriate x-component boundary condition on the right and left wall inside the ‘input2d’ </a:t>
-            </a:r>
-            <a:r>
-              <a:rPr lang="en" sz="2800" dirty="0" smtClean="0"/>
-              <a:t>file.</a:t>
+              <a:t>This is done by setting the appropriate x-component boundary condition on the right and left wall inside the ‘input2d’ file.</a:t>
             </a:r>
           </a:p>
           <a:p>
             <a:pPr lvl="0"/>
             <a:r>
-              <a:rPr lang="en" sz="2800" dirty="0" smtClean="0"/>
+              <a:rPr lang="en" sz="2800" dirty="0"/>
               <a:t>Look on github Examples under </a:t>
             </a:r>
             <a:r>
@@ -19996,7 +20195,7 @@
 </p:sld>
 </file>
 
-<file path=ppt/slides/slide13.xml><?xml version="1.0" encoding="utf-8"?>
+<file path=ppt/slides/slide14.xml><?xml version="1.0" encoding="utf-8"?>
 <p:sld xmlns:a="http://schemas.openxmlformats.org/drawingml/2006/main" xmlns:r="http://schemas.openxmlformats.org/officeDocument/2006/relationships" xmlns:p="http://schemas.openxmlformats.org/presentationml/2006/main">
   <p:cSld>
     <p:spTree>
@@ -20068,7 +20267,7 @@
 </p:sld>
 </file>
 
-<file path=ppt/slides/slide14.xml><?xml version="1.0" encoding="utf-8"?>
+<file path=ppt/slides/slide15.xml><?xml version="1.0" encoding="utf-8"?>
 <p:sld xmlns:a="http://schemas.openxmlformats.org/drawingml/2006/main" xmlns:r="http://schemas.openxmlformats.org/officeDocument/2006/relationships" xmlns:p="http://schemas.openxmlformats.org/presentationml/2006/main">
   <p:cSld>
     <p:spTree>
@@ -20181,15 +20380,7 @@
             </a:pPr>
             <a:r>
               <a:rPr lang="en-US" sz="2400" dirty="0"/>
-              <a:t>We want to model a periodic array of (fixed) cylinders in </a:t>
-            </a:r>
-            <a:r>
-              <a:rPr lang="en-US" sz="2400" dirty="0" smtClean="0"/>
-              <a:t>shear </a:t>
-            </a:r>
-            <a:r>
-              <a:rPr lang="en-US" sz="2400" dirty="0"/>
-              <a:t>flow.</a:t>
+              <a:t>We want to model a periodic array of (fixed) cylinders in shear flow.</a:t>
             </a:r>
             <a:endParaRPr sz="2400" dirty="0"/>
           </a:p>
@@ -20242,7 +20433,7 @@
 </p:sld>
 </file>
 
-<file path=ppt/slides/slide15.xml><?xml version="1.0" encoding="utf-8"?>
+<file path=ppt/slides/slide16.xml><?xml version="1.0" encoding="utf-8"?>
 <p:sld xmlns:a="http://schemas.openxmlformats.org/drawingml/2006/main" xmlns:r="http://schemas.openxmlformats.org/officeDocument/2006/relationships" xmlns:p="http://schemas.openxmlformats.org/presentationml/2006/main">
   <p:cSld>
     <p:spTree>
@@ -20942,7 +21133,7 @@
 </p:sld>
 </file>
 
-<file path=ppt/slides/slide16.xml><?xml version="1.0" encoding="utf-8"?>
+<file path=ppt/slides/slide17.xml><?xml version="1.0" encoding="utf-8"?>
 <p:sld xmlns:a="http://schemas.openxmlformats.org/drawingml/2006/main" xmlns:r="http://schemas.openxmlformats.org/officeDocument/2006/relationships" xmlns:p="http://schemas.openxmlformats.org/presentationml/2006/main">
   <p:cSld>
     <p:spTree>
@@ -21313,7 +21504,7 @@
 </p:sld>
 </file>
 
-<file path=ppt/slides/slide17.xml><?xml version="1.0" encoding="utf-8"?>
+<file path=ppt/slides/slide18.xml><?xml version="1.0" encoding="utf-8"?>
 <p:sld xmlns:a="http://schemas.openxmlformats.org/drawingml/2006/main" xmlns:r="http://schemas.openxmlformats.org/officeDocument/2006/relationships" xmlns:p="http://schemas.openxmlformats.org/presentationml/2006/main">
   <p:cSld>
     <p:spTree>
@@ -21513,7 +21704,7 @@
 </p:sld>
 </file>
 
-<file path=ppt/slides/slide18.xml><?xml version="1.0" encoding="utf-8"?>
+<file path=ppt/slides/slide19.xml><?xml version="1.0" encoding="utf-8"?>
 <p:sld xmlns:a="http://schemas.openxmlformats.org/drawingml/2006/main" xmlns:r="http://schemas.openxmlformats.org/officeDocument/2006/relationships" xmlns:p="http://schemas.openxmlformats.org/presentationml/2006/main">
   <p:cSld>
     <p:spTree>
@@ -21613,7 +21804,174 @@
 </p:sld>
 </file>
 
-<file path=ppt/slides/slide19.xml><?xml version="1.0" encoding="utf-8"?>
+<file path=ppt/slides/slide2.xml><?xml version="1.0" encoding="utf-8"?>
+<p:sld xmlns:a="http://schemas.openxmlformats.org/drawingml/2006/main" xmlns:r="http://schemas.openxmlformats.org/officeDocument/2006/relationships" xmlns:p="http://schemas.openxmlformats.org/presentationml/2006/main">
+  <p:cSld>
+    <p:spTree>
+      <p:nvGrpSpPr>
+        <p:cNvPr id="1" name=""/>
+        <p:cNvGrpSpPr/>
+        <p:nvPr/>
+      </p:nvGrpSpPr>
+      <p:grpSpPr>
+        <a:xfrm>
+          <a:off x="0" y="0"/>
+          <a:ext cx="0" cy="0"/>
+          <a:chOff x="0" y="0"/>
+          <a:chExt cx="0" cy="0"/>
+        </a:xfrm>
+      </p:grpSpPr>
+      <p:sp>
+        <p:nvSpPr>
+          <p:cNvPr id="3" name="Subtitle 2">
+            <a:extLst>
+              <a:ext uri="{FF2B5EF4-FFF2-40B4-BE49-F238E27FC236}">
+                <a16:creationId xmlns:a16="http://schemas.microsoft.com/office/drawing/2014/main" id="{5E1D6BE5-B41F-EF09-1CDE-60F4308691B5}"/>
+              </a:ext>
+            </a:extLst>
+          </p:cNvPr>
+          <p:cNvSpPr>
+            <a:spLocks noGrp="1"/>
+          </p:cNvSpPr>
+          <p:nvPr>
+            <p:ph type="subTitle" idx="1"/>
+          </p:nvPr>
+        </p:nvSpPr>
+        <p:spPr>
+          <a:xfrm>
+            <a:off x="1562987" y="696433"/>
+            <a:ext cx="6400800" cy="1752600"/>
+          </a:xfrm>
+        </p:spPr>
+        <p:txBody>
+          <a:bodyPr/>
+          <a:lstStyle/>
+          <a:p>
+            <a:r>
+              <a:rPr lang="en-US" dirty="0"/>
+              <a:t>Updating UNC Examples to UA, for IBAMR examples only</a:t>
+            </a:r>
+          </a:p>
+        </p:txBody>
+      </p:sp>
+      <p:sp>
+        <p:nvSpPr>
+          <p:cNvPr id="7" name="TextBox 6">
+            <a:extLst>
+              <a:ext uri="{FF2B5EF4-FFF2-40B4-BE49-F238E27FC236}">
+                <a16:creationId xmlns:a16="http://schemas.microsoft.com/office/drawing/2014/main" id="{7FE790C5-A9EC-C9B3-264D-E23C9ECDC03B}"/>
+              </a:ext>
+            </a:extLst>
+          </p:cNvPr>
+          <p:cNvSpPr txBox="1"/>
+          <p:nvPr/>
+        </p:nvSpPr>
+        <p:spPr>
+          <a:xfrm>
+            <a:off x="829339" y="2324626"/>
+            <a:ext cx="8123275" cy="1384995"/>
+          </a:xfrm>
+          <a:prstGeom prst="rect">
+            <a:avLst/>
+          </a:prstGeom>
+          <a:noFill/>
+        </p:spPr>
+        <p:txBody>
+          <a:bodyPr wrap="square">
+            <a:spAutoFit/>
+          </a:bodyPr>
+          <a:lstStyle/>
+          <a:p>
+            <a:r>
+              <a:rPr lang="en-US" dirty="0"/>
+              <a:t>Go into the </a:t>
+            </a:r>
+            <a:r>
+              <a:rPr lang="en-US" dirty="0" err="1"/>
+              <a:t>makefile</a:t>
+            </a:r>
+            <a:r>
+              <a:rPr lang="en-US" dirty="0"/>
+              <a:t>, and change the IBAMR directories to the following:</a:t>
+            </a:r>
+          </a:p>
+          <a:p>
+            <a:endParaRPr lang="en-US" dirty="0"/>
+          </a:p>
+          <a:p>
+            <a:r>
+              <a:rPr lang="en-US" dirty="0"/>
+              <a:t>IBAMR_SRC_DIR = /groups/lauram9/ib10/</a:t>
+            </a:r>
+            <a:r>
+              <a:rPr lang="en-US" dirty="0" err="1"/>
+              <a:t>ibamr</a:t>
+            </a:r>
+            <a:r>
+              <a:rPr lang="en-US" dirty="0"/>
+              <a:t>/IBAMR </a:t>
+            </a:r>
+          </a:p>
+          <a:p>
+            <a:r>
+              <a:rPr lang="en-US" dirty="0"/>
+              <a:t>IBAMR_BUILD_DIR = /groups/lauram9/ib10/</a:t>
+            </a:r>
+            <a:r>
+              <a:rPr lang="en-US" dirty="0" err="1"/>
+              <a:t>ibamr</a:t>
+            </a:r>
+            <a:r>
+              <a:rPr lang="en-US" dirty="0"/>
+              <a:t>/</a:t>
+            </a:r>
+            <a:r>
+              <a:rPr lang="en-US" dirty="0" err="1"/>
+              <a:t>ibamr</a:t>
+            </a:r>
+            <a:r>
+              <a:rPr lang="en-US" dirty="0"/>
+              <a:t>-</a:t>
+            </a:r>
+            <a:r>
+              <a:rPr lang="en-US" dirty="0" err="1"/>
+              <a:t>objs</a:t>
+            </a:r>
+            <a:r>
+              <a:rPr lang="en-US" dirty="0"/>
+              <a:t>-opt</a:t>
+            </a:r>
+          </a:p>
+          <a:p>
+            <a:endParaRPr lang="en-US" dirty="0"/>
+          </a:p>
+          <a:p>
+            <a:r>
+              <a:rPr lang="en-US" dirty="0"/>
+              <a:t>**Also need to update </a:t>
+            </a:r>
+            <a:r>
+              <a:rPr lang="en-US" dirty="0" err="1"/>
+              <a:t>script.sh</a:t>
+            </a:r>
+            <a:endParaRPr lang="en-US" dirty="0"/>
+          </a:p>
+        </p:txBody>
+      </p:sp>
+    </p:spTree>
+    <p:extLst>
+      <p:ext uri="{BB962C8B-B14F-4D97-AF65-F5344CB8AC3E}">
+        <p14:creationId xmlns:p14="http://schemas.microsoft.com/office/powerpoint/2010/main" val="2705169076"/>
+      </p:ext>
+    </p:extLst>
+  </p:cSld>
+  <p:clrMapOvr>
+    <a:masterClrMapping/>
+  </p:clrMapOvr>
+</p:sld>
+</file>
+
+<file path=ppt/slides/slide20.xml><?xml version="1.0" encoding="utf-8"?>
 <p:sld xmlns:a="http://schemas.openxmlformats.org/drawingml/2006/main" xmlns:r="http://schemas.openxmlformats.org/officeDocument/2006/relationships" xmlns:p="http://schemas.openxmlformats.org/presentationml/2006/main">
   <p:cSld>
     <p:spTree>
@@ -21820,7 +22178,1005 @@
 </p:sld>
 </file>
 
-<file path=ppt/slides/slide2.xml><?xml version="1.0" encoding="utf-8"?>
+<file path=ppt/slides/slide21.xml><?xml version="1.0" encoding="utf-8"?>
+<p:sld xmlns:a="http://schemas.openxmlformats.org/drawingml/2006/main" xmlns:r="http://schemas.openxmlformats.org/officeDocument/2006/relationships" xmlns:p="http://schemas.openxmlformats.org/presentationml/2006/main">
+  <p:cSld>
+    <p:spTree>
+      <p:nvGrpSpPr>
+        <p:cNvPr id="1" name="Shape 256"/>
+        <p:cNvGrpSpPr/>
+        <p:nvPr/>
+      </p:nvGrpSpPr>
+      <p:grpSpPr>
+        <a:xfrm>
+          <a:off x="0" y="0"/>
+          <a:ext cx="0" cy="0"/>
+          <a:chOff x="0" y="0"/>
+          <a:chExt cx="0" cy="0"/>
+        </a:xfrm>
+      </p:grpSpPr>
+      <p:sp>
+        <p:nvSpPr>
+          <p:cNvPr id="257" name="Google Shape;257;p49"/>
+          <p:cNvSpPr txBox="1">
+            <a:spLocks noGrp="1"/>
+          </p:cNvSpPr>
+          <p:nvPr>
+            <p:ph type="title"/>
+          </p:nvPr>
+        </p:nvSpPr>
+        <p:spPr>
+          <a:xfrm>
+            <a:off x="457200" y="274638"/>
+            <a:ext cx="8229600" cy="1143300"/>
+          </a:xfrm>
+          <a:prstGeom prst="rect">
+            <a:avLst/>
+          </a:prstGeom>
+        </p:spPr>
+        <p:txBody>
+          <a:bodyPr spcFirstLastPara="1" wrap="square" lIns="91425" tIns="91425" rIns="91425" bIns="91425" anchor="b" anchorCtr="0">
+            <a:noAutofit/>
+          </a:bodyPr>
+          <a:lstStyle/>
+          <a:p>
+            <a:pPr marL="0" lvl="0" indent="0" algn="l" rtl="0">
+              <a:spcBef>
+                <a:spcPts val="0"/>
+              </a:spcBef>
+              <a:spcAft>
+                <a:spcPts val="0"/>
+              </a:spcAft>
+              <a:buNone/>
+            </a:pPr>
+            <a:r>
+              <a:rPr lang="en-US"/>
+              <a:t>Coarsest grid</a:t>
+            </a:r>
+            <a:endParaRPr/>
+          </a:p>
+        </p:txBody>
+      </p:sp>
+      <p:sp>
+        <p:nvSpPr>
+          <p:cNvPr id="258" name="Google Shape;258;p49"/>
+          <p:cNvSpPr txBox="1">
+            <a:spLocks noGrp="1"/>
+          </p:cNvSpPr>
+          <p:nvPr>
+            <p:ph type="body" idx="1"/>
+          </p:nvPr>
+        </p:nvSpPr>
+        <p:spPr>
+          <a:xfrm>
+            <a:off x="457200" y="1600200"/>
+            <a:ext cx="8229600" cy="4967700"/>
+          </a:xfrm>
+          <a:prstGeom prst="rect">
+            <a:avLst/>
+          </a:prstGeom>
+        </p:spPr>
+        <p:txBody>
+          <a:bodyPr spcFirstLastPara="1" wrap="square" lIns="91425" tIns="91425" rIns="91425" bIns="91425" anchor="t" anchorCtr="0">
+            <a:noAutofit/>
+          </a:bodyPr>
+          <a:lstStyle/>
+          <a:p>
+            <a:pPr marL="457200" lvl="0" indent="-355600" algn="l" rtl="0">
+              <a:spcBef>
+                <a:spcPts val="600"/>
+              </a:spcBef>
+              <a:spcAft>
+                <a:spcPts val="0"/>
+              </a:spcAft>
+              <a:buSzPts val="2000"/>
+              <a:buChar char="●"/>
+            </a:pPr>
+            <a:r>
+              <a:rPr lang="en-US" sz="2000"/>
+              <a:t>The finest level in the longest direction has 512 nodes.</a:t>
+            </a:r>
+            <a:endParaRPr sz="2000"/>
+          </a:p>
+          <a:p>
+            <a:pPr marL="457200" lvl="0" indent="-355600" algn="l" rtl="0">
+              <a:spcBef>
+                <a:spcPts val="1000"/>
+              </a:spcBef>
+              <a:spcAft>
+                <a:spcPts val="0"/>
+              </a:spcAft>
+              <a:buSzPts val="2000"/>
+              <a:buChar char="●"/>
+            </a:pPr>
+            <a:r>
+              <a:rPr lang="en-US" sz="2000"/>
+              <a:t>There are 3 levels with a 4:1 ratio of refinement each.</a:t>
+            </a:r>
+            <a:endParaRPr sz="2000"/>
+          </a:p>
+          <a:p>
+            <a:pPr marL="457200" lvl="0" indent="-355600" algn="l" rtl="0">
+              <a:spcBef>
+                <a:spcPts val="1000"/>
+              </a:spcBef>
+              <a:spcAft>
+                <a:spcPts val="0"/>
+              </a:spcAft>
+              <a:buSzPts val="2000"/>
+              <a:buChar char="●"/>
+            </a:pPr>
+            <a:r>
+              <a:rPr lang="en-US" sz="2000"/>
+              <a:t>This means the coarsest level in the longest direction has N = 512*(¼)^(3-1) = 32 nodes</a:t>
+            </a:r>
+            <a:endParaRPr sz="2000"/>
+          </a:p>
+          <a:p>
+            <a:pPr marL="457200" lvl="0" indent="-355600" algn="l" rtl="0">
+              <a:spcBef>
+                <a:spcPts val="1000"/>
+              </a:spcBef>
+              <a:spcAft>
+                <a:spcPts val="0"/>
+              </a:spcAft>
+              <a:buSzPts val="2000"/>
+              <a:buChar char="●"/>
+            </a:pPr>
+            <a:r>
+              <a:rPr lang="en-US" sz="2000"/>
+              <a:t>The coarsest level in the shorter directions have N/8 = 4 nodes.</a:t>
+            </a:r>
+            <a:endParaRPr sz="2000"/>
+          </a:p>
+          <a:p>
+            <a:pPr marL="457200" lvl="0" indent="-355600" algn="l" rtl="0">
+              <a:spcBef>
+                <a:spcPts val="1000"/>
+              </a:spcBef>
+              <a:spcAft>
+                <a:spcPts val="1000"/>
+              </a:spcAft>
+              <a:buSzPts val="2000"/>
+              <a:buChar char="●"/>
+            </a:pPr>
+            <a:r>
+              <a:rPr lang="en-US" sz="2000"/>
+              <a:t>In input3D:</a:t>
+            </a:r>
+            <a:endParaRPr sz="2000"/>
+          </a:p>
+        </p:txBody>
+      </p:sp>
+      <p:sp>
+        <p:nvSpPr>
+          <p:cNvPr id="259" name="Google Shape;259;p49"/>
+          <p:cNvSpPr txBox="1"/>
+          <p:nvPr/>
+        </p:nvSpPr>
+        <p:spPr>
+          <a:xfrm>
+            <a:off x="348490" y="3071860"/>
+            <a:ext cx="8649000" cy="3999900"/>
+          </a:xfrm>
+          <a:prstGeom prst="rect">
+            <a:avLst/>
+          </a:prstGeom>
+          <a:noFill/>
+          <a:ln>
+            <a:noFill/>
+          </a:ln>
+        </p:spPr>
+        <p:txBody>
+          <a:bodyPr spcFirstLastPara="1" wrap="square" lIns="91425" tIns="91425" rIns="91425" bIns="91425" anchor="ctr" anchorCtr="0">
+            <a:noAutofit/>
+          </a:bodyPr>
+          <a:lstStyle/>
+          <a:p>
+            <a:pPr marL="0" lvl="0" indent="0" algn="l" rtl="0">
+              <a:spcBef>
+                <a:spcPts val="0"/>
+              </a:spcBef>
+              <a:spcAft>
+                <a:spcPts val="0"/>
+              </a:spcAft>
+              <a:buNone/>
+            </a:pPr>
+            <a:r>
+              <a:rPr lang="en-US" sz="1200" dirty="0"/>
+              <a:t>N = 32                                     				// actual number of grid cells on coarsest grid in longest direction</a:t>
+            </a:r>
+            <a:endParaRPr sz="1200" dirty="0"/>
+          </a:p>
+          <a:p>
+            <a:pPr marL="0" lvl="0" indent="0" algn="l" rtl="0">
+              <a:spcBef>
+                <a:spcPts val="0"/>
+              </a:spcBef>
+              <a:spcAft>
+                <a:spcPts val="0"/>
+              </a:spcAft>
+              <a:buNone/>
+            </a:pPr>
+            <a:r>
+              <a:rPr lang="en-US" sz="1200" dirty="0"/>
+              <a:t>NFINEST = (REF_RATIO^(MAX_LEVELS - 1))*N  	// effective number of grid cells on finest grid in the longest direction</a:t>
+            </a:r>
+            <a:endParaRPr sz="1200" dirty="0"/>
+          </a:p>
+        </p:txBody>
+      </p:sp>
+    </p:spTree>
+    <p:extLst>
+      <p:ext uri="{BB962C8B-B14F-4D97-AF65-F5344CB8AC3E}">
+        <p14:creationId xmlns:p14="http://schemas.microsoft.com/office/powerpoint/2010/main" val="2338677629"/>
+      </p:ext>
+    </p:extLst>
+  </p:cSld>
+  <p:clrMapOvr>
+    <a:masterClrMapping/>
+  </p:clrMapOvr>
+</p:sld>
+</file>
+
+<file path=ppt/slides/slide22.xml><?xml version="1.0" encoding="utf-8"?>
+<p:sld xmlns:a="http://schemas.openxmlformats.org/drawingml/2006/main" xmlns:r="http://schemas.openxmlformats.org/officeDocument/2006/relationships" xmlns:p="http://schemas.openxmlformats.org/presentationml/2006/main">
+  <p:cSld>
+    <p:spTree>
+      <p:nvGrpSpPr>
+        <p:cNvPr id="1" name="Shape 263"/>
+        <p:cNvGrpSpPr/>
+        <p:nvPr/>
+      </p:nvGrpSpPr>
+      <p:grpSpPr>
+        <a:xfrm>
+          <a:off x="0" y="0"/>
+          <a:ext cx="0" cy="0"/>
+          <a:chOff x="0" y="0"/>
+          <a:chExt cx="0" cy="0"/>
+        </a:xfrm>
+      </p:grpSpPr>
+      <p:sp>
+        <p:nvSpPr>
+          <p:cNvPr id="264" name="Google Shape;264;p50"/>
+          <p:cNvSpPr txBox="1">
+            <a:spLocks noGrp="1"/>
+          </p:cNvSpPr>
+          <p:nvPr>
+            <p:ph type="title"/>
+          </p:nvPr>
+        </p:nvSpPr>
+        <p:spPr>
+          <a:xfrm>
+            <a:off x="457200" y="274638"/>
+            <a:ext cx="8229600" cy="1143300"/>
+          </a:xfrm>
+          <a:prstGeom prst="rect">
+            <a:avLst/>
+          </a:prstGeom>
+        </p:spPr>
+        <p:txBody>
+          <a:bodyPr spcFirstLastPara="1" wrap="square" lIns="91425" tIns="91425" rIns="91425" bIns="91425" anchor="b" anchorCtr="0">
+            <a:noAutofit/>
+          </a:bodyPr>
+          <a:lstStyle/>
+          <a:p>
+            <a:pPr marL="0" lvl="0" indent="0" algn="l" rtl="0">
+              <a:spcBef>
+                <a:spcPts val="0"/>
+              </a:spcBef>
+              <a:spcAft>
+                <a:spcPts val="0"/>
+              </a:spcAft>
+              <a:buNone/>
+            </a:pPr>
+            <a:r>
+              <a:rPr lang="en-US"/>
+              <a:t>AMR - Cartesian Geometry</a:t>
+            </a:r>
+            <a:endParaRPr/>
+          </a:p>
+        </p:txBody>
+      </p:sp>
+      <p:sp>
+        <p:nvSpPr>
+          <p:cNvPr id="265" name="Google Shape;265;p50"/>
+          <p:cNvSpPr txBox="1">
+            <a:spLocks noGrp="1"/>
+          </p:cNvSpPr>
+          <p:nvPr>
+            <p:ph type="body" idx="1"/>
+          </p:nvPr>
+        </p:nvSpPr>
+        <p:spPr>
+          <a:xfrm>
+            <a:off x="457200" y="1600200"/>
+            <a:ext cx="8229600" cy="4967700"/>
+          </a:xfrm>
+          <a:prstGeom prst="rect">
+            <a:avLst/>
+          </a:prstGeom>
+        </p:spPr>
+        <p:txBody>
+          <a:bodyPr spcFirstLastPara="1" wrap="square" lIns="91425" tIns="91425" rIns="91425" bIns="91425" anchor="t" anchorCtr="0">
+            <a:noAutofit/>
+          </a:bodyPr>
+          <a:lstStyle/>
+          <a:p>
+            <a:pPr marL="457200" lvl="0" indent="-381000" algn="l" rtl="0">
+              <a:spcBef>
+                <a:spcPts val="600"/>
+              </a:spcBef>
+              <a:spcAft>
+                <a:spcPts val="0"/>
+              </a:spcAft>
+              <a:buSzPts val="2400"/>
+              <a:buChar char="●"/>
+            </a:pPr>
+            <a:r>
+              <a:rPr lang="en-US" sz="2400"/>
+              <a:t>The domain boxes should go from 0 to M-1, where M is the number of nodes on the coarsest grid in that direction.</a:t>
+            </a:r>
+            <a:endParaRPr sz="2400"/>
+          </a:p>
+          <a:p>
+            <a:pPr marL="457200" lvl="0" indent="-381000" algn="l" rtl="0">
+              <a:spcBef>
+                <a:spcPts val="0"/>
+              </a:spcBef>
+              <a:spcAft>
+                <a:spcPts val="0"/>
+              </a:spcAft>
+              <a:buSzPts val="2400"/>
+              <a:buChar char="●"/>
+            </a:pPr>
+            <a:r>
+              <a:rPr lang="en-US" sz="2400"/>
+              <a:t>The upper and lower physical dimensions of the computational domain should also be declared here.</a:t>
+            </a:r>
+            <a:endParaRPr sz="2400"/>
+          </a:p>
+        </p:txBody>
+      </p:sp>
+      <p:sp>
+        <p:nvSpPr>
+          <p:cNvPr id="266" name="Google Shape;266;p50"/>
+          <p:cNvSpPr txBox="1"/>
+          <p:nvPr/>
+        </p:nvSpPr>
+        <p:spPr>
+          <a:xfrm>
+            <a:off x="841650" y="3644504"/>
+            <a:ext cx="7460700" cy="2663100"/>
+          </a:xfrm>
+          <a:prstGeom prst="rect">
+            <a:avLst/>
+          </a:prstGeom>
+          <a:noFill/>
+          <a:ln>
+            <a:noFill/>
+          </a:ln>
+        </p:spPr>
+        <p:txBody>
+          <a:bodyPr spcFirstLastPara="1" wrap="square" lIns="91425" tIns="91425" rIns="91425" bIns="91425" anchor="ctr" anchorCtr="0">
+            <a:noAutofit/>
+          </a:bodyPr>
+          <a:lstStyle/>
+          <a:p>
+            <a:pPr marL="0" lvl="0" indent="0" algn="l" rtl="0">
+              <a:spcBef>
+                <a:spcPts val="0"/>
+              </a:spcBef>
+              <a:spcAft>
+                <a:spcPts val="0"/>
+              </a:spcAft>
+              <a:buNone/>
+            </a:pPr>
+            <a:r>
+              <a:rPr lang="en-US" dirty="0" err="1"/>
+              <a:t>CartesianGeometry</a:t>
+            </a:r>
+            <a:r>
+              <a:rPr lang="en-US" dirty="0"/>
+              <a:t> {                //</a:t>
+            </a:r>
+            <a:endParaRPr dirty="0"/>
+          </a:p>
+          <a:p>
+            <a:pPr marL="0" lvl="0" indent="0" algn="l" rtl="0">
+              <a:spcBef>
+                <a:spcPts val="0"/>
+              </a:spcBef>
+              <a:spcAft>
+                <a:spcPts val="0"/>
+              </a:spcAft>
+              <a:buNone/>
+            </a:pPr>
+            <a:r>
+              <a:rPr lang="en-US" dirty="0"/>
+              <a:t>   </a:t>
+            </a:r>
+            <a:r>
+              <a:rPr lang="en-US" dirty="0" err="1"/>
+              <a:t>domain_boxes</a:t>
+            </a:r>
+            <a:r>
+              <a:rPr lang="en-US" dirty="0"/>
+              <a:t> = [ (0,0,0) , (N/8 - 1,N/8 - 1,N - 1) ]//</a:t>
+            </a:r>
+            <a:endParaRPr dirty="0"/>
+          </a:p>
+          <a:p>
+            <a:pPr marL="0" lvl="0" indent="0" algn="l" rtl="0">
+              <a:spcBef>
+                <a:spcPts val="0"/>
+              </a:spcBef>
+              <a:spcAft>
+                <a:spcPts val="0"/>
+              </a:spcAft>
+              <a:buNone/>
+            </a:pPr>
+            <a:r>
+              <a:rPr lang="en-US" dirty="0"/>
+              <a:t>   </a:t>
+            </a:r>
+            <a:r>
+              <a:rPr lang="en-US" dirty="0" err="1"/>
+              <a:t>x_lo</a:t>
+            </a:r>
+            <a:r>
+              <a:rPr lang="en-US" dirty="0"/>
+              <a:t> = -L/16, -L/16, -L/2   // lower end of computational domain.</a:t>
+            </a:r>
+            <a:endParaRPr dirty="0"/>
+          </a:p>
+          <a:p>
+            <a:pPr marL="0" lvl="0" indent="0" algn="l" rtl="0">
+              <a:spcBef>
+                <a:spcPts val="0"/>
+              </a:spcBef>
+              <a:spcAft>
+                <a:spcPts val="0"/>
+              </a:spcAft>
+              <a:buNone/>
+            </a:pPr>
+            <a:r>
+              <a:rPr lang="en-US" dirty="0"/>
+              <a:t>   </a:t>
+            </a:r>
+            <a:r>
+              <a:rPr lang="en-US" dirty="0" err="1"/>
+              <a:t>x_up</a:t>
+            </a:r>
+            <a:r>
+              <a:rPr lang="en-US" dirty="0"/>
+              <a:t> =  L/16,  L/16, L/2  // upper end of computational domain.</a:t>
+            </a:r>
+            <a:endParaRPr dirty="0"/>
+          </a:p>
+          <a:p>
+            <a:pPr marL="0" lvl="0" indent="0" algn="l" rtl="0">
+              <a:spcBef>
+                <a:spcPts val="0"/>
+              </a:spcBef>
+              <a:spcAft>
+                <a:spcPts val="0"/>
+              </a:spcAft>
+              <a:buNone/>
+            </a:pPr>
+            <a:r>
+              <a:rPr lang="en-US" dirty="0"/>
+              <a:t>   </a:t>
+            </a:r>
+            <a:r>
+              <a:rPr lang="en-US" dirty="0" err="1"/>
+              <a:t>periodic_dimension</a:t>
+            </a:r>
+            <a:r>
+              <a:rPr lang="en-US" dirty="0"/>
+              <a:t> = 1, 1, 0               //</a:t>
+            </a:r>
+            <a:endParaRPr dirty="0"/>
+          </a:p>
+          <a:p>
+            <a:pPr marL="0" lvl="0" indent="0" algn="l" rtl="0">
+              <a:spcBef>
+                <a:spcPts val="0"/>
+              </a:spcBef>
+              <a:spcAft>
+                <a:spcPts val="0"/>
+              </a:spcAft>
+              <a:buNone/>
+            </a:pPr>
+            <a:r>
+              <a:rPr lang="en-US" dirty="0"/>
+              <a:t>} //</a:t>
+            </a:r>
+            <a:endParaRPr dirty="0"/>
+          </a:p>
+        </p:txBody>
+      </p:sp>
+    </p:spTree>
+    <p:extLst>
+      <p:ext uri="{BB962C8B-B14F-4D97-AF65-F5344CB8AC3E}">
+        <p14:creationId xmlns:p14="http://schemas.microsoft.com/office/powerpoint/2010/main" val="3047381586"/>
+      </p:ext>
+    </p:extLst>
+  </p:cSld>
+  <p:clrMapOvr>
+    <a:masterClrMapping/>
+  </p:clrMapOvr>
+</p:sld>
+</file>
+
+<file path=ppt/slides/slide23.xml><?xml version="1.0" encoding="utf-8"?>
+<p:sld xmlns:a="http://schemas.openxmlformats.org/drawingml/2006/main" xmlns:r="http://schemas.openxmlformats.org/officeDocument/2006/relationships" xmlns:p="http://schemas.openxmlformats.org/presentationml/2006/main">
+  <p:cSld>
+    <p:spTree>
+      <p:nvGrpSpPr>
+        <p:cNvPr id="1" name="Shape 270"/>
+        <p:cNvGrpSpPr/>
+        <p:nvPr/>
+      </p:nvGrpSpPr>
+      <p:grpSpPr>
+        <a:xfrm>
+          <a:off x="0" y="0"/>
+          <a:ext cx="0" cy="0"/>
+          <a:chOff x="0" y="0"/>
+          <a:chExt cx="0" cy="0"/>
+        </a:xfrm>
+      </p:grpSpPr>
+      <p:sp>
+        <p:nvSpPr>
+          <p:cNvPr id="271" name="Google Shape;271;p51"/>
+          <p:cNvSpPr txBox="1">
+            <a:spLocks noGrp="1"/>
+          </p:cNvSpPr>
+          <p:nvPr>
+            <p:ph type="title"/>
+          </p:nvPr>
+        </p:nvSpPr>
+        <p:spPr>
+          <a:xfrm>
+            <a:off x="457200" y="274638"/>
+            <a:ext cx="8229600" cy="1143300"/>
+          </a:xfrm>
+          <a:prstGeom prst="rect">
+            <a:avLst/>
+          </a:prstGeom>
+        </p:spPr>
+        <p:txBody>
+          <a:bodyPr spcFirstLastPara="1" wrap="square" lIns="91425" tIns="91425" rIns="91425" bIns="91425" anchor="b" anchorCtr="0">
+            <a:noAutofit/>
+          </a:bodyPr>
+          <a:lstStyle/>
+          <a:p>
+            <a:pPr marL="0" lvl="0" indent="0" algn="l" rtl="0">
+              <a:spcBef>
+                <a:spcPts val="0"/>
+              </a:spcBef>
+              <a:spcAft>
+                <a:spcPts val="0"/>
+              </a:spcAft>
+              <a:buNone/>
+            </a:pPr>
+            <a:r>
+              <a:rPr lang="en-US"/>
+              <a:t>Patch sizes</a:t>
+            </a:r>
+            <a:endParaRPr/>
+          </a:p>
+        </p:txBody>
+      </p:sp>
+      <p:sp>
+        <p:nvSpPr>
+          <p:cNvPr id="272" name="Google Shape;272;p51"/>
+          <p:cNvSpPr txBox="1">
+            <a:spLocks noGrp="1"/>
+          </p:cNvSpPr>
+          <p:nvPr>
+            <p:ph type="body" idx="1"/>
+          </p:nvPr>
+        </p:nvSpPr>
+        <p:spPr>
+          <a:xfrm>
+            <a:off x="457200" y="1295400"/>
+            <a:ext cx="8229600" cy="4967700"/>
+          </a:xfrm>
+          <a:prstGeom prst="rect">
+            <a:avLst/>
+          </a:prstGeom>
+        </p:spPr>
+        <p:txBody>
+          <a:bodyPr spcFirstLastPara="1" wrap="square" lIns="91425" tIns="91425" rIns="91425" bIns="91425" anchor="t" anchorCtr="0">
+            <a:noAutofit/>
+          </a:bodyPr>
+          <a:lstStyle/>
+          <a:p>
+            <a:pPr marL="457200" lvl="0" indent="-381000" algn="l" rtl="0">
+              <a:spcBef>
+                <a:spcPts val="600"/>
+              </a:spcBef>
+              <a:spcAft>
+                <a:spcPts val="0"/>
+              </a:spcAft>
+              <a:buSzPts val="2400"/>
+              <a:buChar char="●"/>
+            </a:pPr>
+            <a:r>
+              <a:rPr lang="en-US" sz="2400"/>
+              <a:t>The largest patch size should be a cube of the finest grid that fills the domain in the shortest direction(s).</a:t>
+            </a:r>
+            <a:endParaRPr sz="2400"/>
+          </a:p>
+          <a:p>
+            <a:pPr marL="457200" lvl="0" indent="-381000" algn="l" rtl="0">
+              <a:spcBef>
+                <a:spcPts val="0"/>
+              </a:spcBef>
+              <a:spcAft>
+                <a:spcPts val="0"/>
+              </a:spcAft>
+              <a:buSzPts val="2400"/>
+              <a:buChar char="●"/>
+            </a:pPr>
+            <a:r>
+              <a:rPr lang="en-US" sz="2400"/>
+              <a:t>The smallest patch size should be a cube of the coarsest grid that fills the domain in the shortest directions.</a:t>
+            </a:r>
+            <a:endParaRPr sz="2400"/>
+          </a:p>
+        </p:txBody>
+      </p:sp>
+      <p:sp>
+        <p:nvSpPr>
+          <p:cNvPr id="273" name="Google Shape;273;p51"/>
+          <p:cNvSpPr txBox="1"/>
+          <p:nvPr/>
+        </p:nvSpPr>
+        <p:spPr>
+          <a:xfrm>
+            <a:off x="646176" y="3162433"/>
+            <a:ext cx="8329500" cy="3289200"/>
+          </a:xfrm>
+          <a:prstGeom prst="rect">
+            <a:avLst/>
+          </a:prstGeom>
+          <a:noFill/>
+          <a:ln>
+            <a:noFill/>
+          </a:ln>
+        </p:spPr>
+        <p:txBody>
+          <a:bodyPr spcFirstLastPara="1" wrap="square" lIns="91425" tIns="91425" rIns="91425" bIns="91425" anchor="ctr" anchorCtr="0">
+            <a:noAutofit/>
+          </a:bodyPr>
+          <a:lstStyle/>
+          <a:p>
+            <a:pPr marL="0" lvl="0" indent="0" algn="l" rtl="0">
+              <a:spcBef>
+                <a:spcPts val="0"/>
+              </a:spcBef>
+              <a:spcAft>
+                <a:spcPts val="0"/>
+              </a:spcAft>
+              <a:buNone/>
+            </a:pPr>
+            <a:r>
+              <a:rPr lang="en-US" dirty="0"/>
+              <a:t>   </a:t>
+            </a:r>
+            <a:r>
+              <a:rPr lang="en-US" dirty="0" err="1"/>
+              <a:t>largest_patch_size</a:t>
+            </a:r>
+            <a:r>
+              <a:rPr lang="en-US" dirty="0"/>
+              <a:t> {                //</a:t>
+            </a:r>
+            <a:endParaRPr dirty="0"/>
+          </a:p>
+          <a:p>
+            <a:pPr marL="0" lvl="0" indent="0" algn="l" rtl="0">
+              <a:spcBef>
+                <a:spcPts val="0"/>
+              </a:spcBef>
+              <a:spcAft>
+                <a:spcPts val="0"/>
+              </a:spcAft>
+              <a:buNone/>
+            </a:pPr>
+            <a:r>
+              <a:rPr lang="en-US" dirty="0"/>
+              <a:t>      level_0 = NFINEST/8, NFINEST/8, NFINEST/8  // largest patch allowed in hierarchy</a:t>
+            </a:r>
+            <a:endParaRPr dirty="0"/>
+          </a:p>
+          <a:p>
+            <a:pPr marL="0" lvl="0" indent="0" algn="l" rtl="0">
+              <a:spcBef>
+                <a:spcPts val="0"/>
+              </a:spcBef>
+              <a:spcAft>
+                <a:spcPts val="0"/>
+              </a:spcAft>
+              <a:buNone/>
+            </a:pPr>
+            <a:r>
+              <a:rPr lang="en-US" dirty="0"/>
+              <a:t>                                  // NOTE: all finer levels will use same values as level_0...</a:t>
+            </a:r>
+            <a:endParaRPr dirty="0"/>
+          </a:p>
+          <a:p>
+            <a:pPr marL="0" lvl="0" indent="0" algn="l" rtl="0">
+              <a:spcBef>
+                <a:spcPts val="0"/>
+              </a:spcBef>
+              <a:spcAft>
+                <a:spcPts val="0"/>
+              </a:spcAft>
+              <a:buNone/>
+            </a:pPr>
+            <a:r>
+              <a:rPr lang="en-US" dirty="0"/>
+              <a:t>   } //</a:t>
+            </a:r>
+            <a:endParaRPr dirty="0"/>
+          </a:p>
+          <a:p>
+            <a:pPr marL="0" lvl="0" indent="0" algn="l" rtl="0">
+              <a:spcBef>
+                <a:spcPts val="0"/>
+              </a:spcBef>
+              <a:spcAft>
+                <a:spcPts val="0"/>
+              </a:spcAft>
+              <a:buNone/>
+            </a:pPr>
+            <a:r>
+              <a:rPr lang="en-US" dirty="0"/>
+              <a:t>//</a:t>
+            </a:r>
+            <a:endParaRPr dirty="0"/>
+          </a:p>
+          <a:p>
+            <a:pPr marL="0" lvl="0" indent="0" algn="l" rtl="0">
+              <a:spcBef>
+                <a:spcPts val="0"/>
+              </a:spcBef>
+              <a:spcAft>
+                <a:spcPts val="0"/>
+              </a:spcAft>
+              <a:buNone/>
+            </a:pPr>
+            <a:r>
+              <a:rPr lang="en-US" dirty="0"/>
+              <a:t>   </a:t>
+            </a:r>
+            <a:r>
+              <a:rPr lang="en-US" dirty="0" err="1"/>
+              <a:t>smallest_patch_size</a:t>
+            </a:r>
+            <a:r>
+              <a:rPr lang="en-US" dirty="0"/>
+              <a:t> {                //</a:t>
+            </a:r>
+            <a:endParaRPr dirty="0"/>
+          </a:p>
+          <a:p>
+            <a:pPr marL="0" lvl="0" indent="0" algn="l" rtl="0">
+              <a:spcBef>
+                <a:spcPts val="0"/>
+              </a:spcBef>
+              <a:spcAft>
+                <a:spcPts val="0"/>
+              </a:spcAft>
+              <a:buNone/>
+            </a:pPr>
+            <a:r>
+              <a:rPr lang="en-US" dirty="0"/>
+              <a:t>      level_0 = 4, 4, 4              // smallest patch allowed in hierarchy</a:t>
+            </a:r>
+            <a:endParaRPr dirty="0"/>
+          </a:p>
+          <a:p>
+            <a:pPr marL="0" lvl="0" indent="0" algn="l" rtl="0">
+              <a:spcBef>
+                <a:spcPts val="0"/>
+              </a:spcBef>
+              <a:spcAft>
+                <a:spcPts val="0"/>
+              </a:spcAft>
+              <a:buNone/>
+            </a:pPr>
+            <a:r>
+              <a:rPr lang="en-US" dirty="0"/>
+              <a:t>                                  // NOTE: all finer levels will use same values as level_0...</a:t>
+            </a:r>
+            <a:endParaRPr dirty="0"/>
+          </a:p>
+          <a:p>
+            <a:pPr marL="0" lvl="0" indent="0" algn="l" rtl="0">
+              <a:spcBef>
+                <a:spcPts val="0"/>
+              </a:spcBef>
+              <a:spcAft>
+                <a:spcPts val="0"/>
+              </a:spcAft>
+              <a:buNone/>
+            </a:pPr>
+            <a:r>
+              <a:rPr lang="en-US" dirty="0"/>
+              <a:t>   }                //</a:t>
+            </a:r>
+            <a:endParaRPr dirty="0"/>
+          </a:p>
+        </p:txBody>
+      </p:sp>
+    </p:spTree>
+    <p:extLst>
+      <p:ext uri="{BB962C8B-B14F-4D97-AF65-F5344CB8AC3E}">
+        <p14:creationId xmlns:p14="http://schemas.microsoft.com/office/powerpoint/2010/main" val="2717359942"/>
+      </p:ext>
+    </p:extLst>
+  </p:cSld>
+  <p:clrMapOvr>
+    <a:masterClrMapping/>
+  </p:clrMapOvr>
+</p:sld>
+</file>
+
+<file path=ppt/slides/slide24.xml><?xml version="1.0" encoding="utf-8"?>
+<p:sld xmlns:a="http://schemas.openxmlformats.org/drawingml/2006/main" xmlns:r="http://schemas.openxmlformats.org/officeDocument/2006/relationships" xmlns:p="http://schemas.openxmlformats.org/presentationml/2006/main">
+  <p:cSld>
+    <p:spTree>
+      <p:nvGrpSpPr>
+        <p:cNvPr id="1" name="Shape 277"/>
+        <p:cNvGrpSpPr/>
+        <p:nvPr/>
+      </p:nvGrpSpPr>
+      <p:grpSpPr>
+        <a:xfrm>
+          <a:off x="0" y="0"/>
+          <a:ext cx="0" cy="0"/>
+          <a:chOff x="0" y="0"/>
+          <a:chExt cx="0" cy="0"/>
+        </a:xfrm>
+      </p:grpSpPr>
+      <p:sp>
+        <p:nvSpPr>
+          <p:cNvPr id="278" name="Google Shape;278;p52"/>
+          <p:cNvSpPr txBox="1">
+            <a:spLocks noGrp="1"/>
+          </p:cNvSpPr>
+          <p:nvPr>
+            <p:ph type="title"/>
+          </p:nvPr>
+        </p:nvSpPr>
+        <p:spPr>
+          <a:xfrm>
+            <a:off x="457200" y="274638"/>
+            <a:ext cx="8229600" cy="1143300"/>
+          </a:xfrm>
+          <a:prstGeom prst="rect">
+            <a:avLst/>
+          </a:prstGeom>
+        </p:spPr>
+        <p:txBody>
+          <a:bodyPr spcFirstLastPara="1" wrap="square" lIns="91425" tIns="91425" rIns="91425" bIns="91425" anchor="b" anchorCtr="0">
+            <a:noAutofit/>
+          </a:bodyPr>
+          <a:lstStyle/>
+          <a:p>
+            <a:pPr marL="0" lvl="0" indent="0" algn="l" rtl="0">
+              <a:spcBef>
+                <a:spcPts val="0"/>
+              </a:spcBef>
+              <a:spcAft>
+                <a:spcPts val="0"/>
+              </a:spcAft>
+              <a:buNone/>
+            </a:pPr>
+            <a:r>
+              <a:rPr lang="en-US"/>
+              <a:t>Summary</a:t>
+            </a:r>
+            <a:endParaRPr/>
+          </a:p>
+        </p:txBody>
+      </p:sp>
+      <p:sp>
+        <p:nvSpPr>
+          <p:cNvPr id="279" name="Google Shape;279;p52"/>
+          <p:cNvSpPr txBox="1">
+            <a:spLocks noGrp="1"/>
+          </p:cNvSpPr>
+          <p:nvPr>
+            <p:ph type="body" idx="1"/>
+          </p:nvPr>
+        </p:nvSpPr>
+        <p:spPr>
+          <a:xfrm>
+            <a:off x="457200" y="1600200"/>
+            <a:ext cx="8229600" cy="4967700"/>
+          </a:xfrm>
+          <a:prstGeom prst="rect">
+            <a:avLst/>
+          </a:prstGeom>
+        </p:spPr>
+        <p:txBody>
+          <a:bodyPr spcFirstLastPara="1" wrap="square" lIns="91425" tIns="91425" rIns="91425" bIns="91425" anchor="t" anchorCtr="0">
+            <a:noAutofit/>
+          </a:bodyPr>
+          <a:lstStyle/>
+          <a:p>
+            <a:pPr marL="457200" lvl="0" indent="-381000" algn="l" rtl="0">
+              <a:spcBef>
+                <a:spcPts val="600"/>
+              </a:spcBef>
+              <a:spcAft>
+                <a:spcPts val="0"/>
+              </a:spcAft>
+              <a:buSzPts val="2400"/>
+              <a:buChar char="●"/>
+            </a:pPr>
+            <a:r>
+              <a:rPr lang="en-US" sz="2400"/>
+              <a:t>You need to make sure that each of the dimensions are such that they are evenly divisible by (refinement_ratio)^(number_levels-1).</a:t>
+            </a:r>
+            <a:endParaRPr sz="2400"/>
+          </a:p>
+          <a:p>
+            <a:pPr marL="457200" lvl="0" indent="-381000" algn="l" rtl="0">
+              <a:spcBef>
+                <a:spcPts val="1000"/>
+              </a:spcBef>
+              <a:spcAft>
+                <a:spcPts val="0"/>
+              </a:spcAft>
+              <a:buSzPts val="2400"/>
+              <a:buChar char="●"/>
+            </a:pPr>
+            <a:r>
+              <a:rPr lang="en-US" sz="2400"/>
+              <a:t>Also make sure you don’t have a coarsest level of size 1 (or even 2) in any dimension.</a:t>
+            </a:r>
+            <a:endParaRPr sz="2400"/>
+          </a:p>
+          <a:p>
+            <a:pPr marL="457200" lvl="0" indent="-381000" algn="l" rtl="0">
+              <a:spcBef>
+                <a:spcPts val="1000"/>
+              </a:spcBef>
+              <a:spcAft>
+                <a:spcPts val="1000"/>
+              </a:spcAft>
+              <a:buSzPts val="2400"/>
+              <a:buChar char="●"/>
+            </a:pPr>
+            <a:r>
+              <a:rPr lang="en-US" sz="2400"/>
+              <a:t>You need to tell IBAMR how it will make the different levels of refinement. What are the bounds on the largest and smallest levels?</a:t>
+            </a:r>
+            <a:endParaRPr sz="2400"/>
+          </a:p>
+        </p:txBody>
+      </p:sp>
+    </p:spTree>
+    <p:extLst>
+      <p:ext uri="{BB962C8B-B14F-4D97-AF65-F5344CB8AC3E}">
+        <p14:creationId xmlns:p14="http://schemas.microsoft.com/office/powerpoint/2010/main" val="692089669"/>
+      </p:ext>
+    </p:extLst>
+  </p:cSld>
+  <p:clrMapOvr>
+    <a:masterClrMapping/>
+  </p:clrMapOvr>
+</p:sld>
+</file>
+
+<file path=ppt/slides/slide3.xml><?xml version="1.0" encoding="utf-8"?>
 <p:sld xmlns:a="http://schemas.openxmlformats.org/drawingml/2006/main" xmlns:r="http://schemas.openxmlformats.org/officeDocument/2006/relationships" xmlns:p="http://schemas.openxmlformats.org/presentationml/2006/main">
   <p:cSld>
     <p:spTree>
@@ -22153,1005 +23509,7 @@
 </p:sld>
 </file>
 
-<file path=ppt/slides/slide20.xml><?xml version="1.0" encoding="utf-8"?>
-<p:sld xmlns:a="http://schemas.openxmlformats.org/drawingml/2006/main" xmlns:r="http://schemas.openxmlformats.org/officeDocument/2006/relationships" xmlns:p="http://schemas.openxmlformats.org/presentationml/2006/main">
-  <p:cSld>
-    <p:spTree>
-      <p:nvGrpSpPr>
-        <p:cNvPr id="1" name="Shape 256"/>
-        <p:cNvGrpSpPr/>
-        <p:nvPr/>
-      </p:nvGrpSpPr>
-      <p:grpSpPr>
-        <a:xfrm>
-          <a:off x="0" y="0"/>
-          <a:ext cx="0" cy="0"/>
-          <a:chOff x="0" y="0"/>
-          <a:chExt cx="0" cy="0"/>
-        </a:xfrm>
-      </p:grpSpPr>
-      <p:sp>
-        <p:nvSpPr>
-          <p:cNvPr id="257" name="Google Shape;257;p49"/>
-          <p:cNvSpPr txBox="1">
-            <a:spLocks noGrp="1"/>
-          </p:cNvSpPr>
-          <p:nvPr>
-            <p:ph type="title"/>
-          </p:nvPr>
-        </p:nvSpPr>
-        <p:spPr>
-          <a:xfrm>
-            <a:off x="457200" y="274638"/>
-            <a:ext cx="8229600" cy="1143300"/>
-          </a:xfrm>
-          <a:prstGeom prst="rect">
-            <a:avLst/>
-          </a:prstGeom>
-        </p:spPr>
-        <p:txBody>
-          <a:bodyPr spcFirstLastPara="1" wrap="square" lIns="91425" tIns="91425" rIns="91425" bIns="91425" anchor="b" anchorCtr="0">
-            <a:noAutofit/>
-          </a:bodyPr>
-          <a:lstStyle/>
-          <a:p>
-            <a:pPr marL="0" lvl="0" indent="0" algn="l" rtl="0">
-              <a:spcBef>
-                <a:spcPts val="0"/>
-              </a:spcBef>
-              <a:spcAft>
-                <a:spcPts val="0"/>
-              </a:spcAft>
-              <a:buNone/>
-            </a:pPr>
-            <a:r>
-              <a:rPr lang="en-US"/>
-              <a:t>Coarsest grid</a:t>
-            </a:r>
-            <a:endParaRPr/>
-          </a:p>
-        </p:txBody>
-      </p:sp>
-      <p:sp>
-        <p:nvSpPr>
-          <p:cNvPr id="258" name="Google Shape;258;p49"/>
-          <p:cNvSpPr txBox="1">
-            <a:spLocks noGrp="1"/>
-          </p:cNvSpPr>
-          <p:nvPr>
-            <p:ph type="body" idx="1"/>
-          </p:nvPr>
-        </p:nvSpPr>
-        <p:spPr>
-          <a:xfrm>
-            <a:off x="457200" y="1600200"/>
-            <a:ext cx="8229600" cy="4967700"/>
-          </a:xfrm>
-          <a:prstGeom prst="rect">
-            <a:avLst/>
-          </a:prstGeom>
-        </p:spPr>
-        <p:txBody>
-          <a:bodyPr spcFirstLastPara="1" wrap="square" lIns="91425" tIns="91425" rIns="91425" bIns="91425" anchor="t" anchorCtr="0">
-            <a:noAutofit/>
-          </a:bodyPr>
-          <a:lstStyle/>
-          <a:p>
-            <a:pPr marL="457200" lvl="0" indent="-355600" algn="l" rtl="0">
-              <a:spcBef>
-                <a:spcPts val="600"/>
-              </a:spcBef>
-              <a:spcAft>
-                <a:spcPts val="0"/>
-              </a:spcAft>
-              <a:buSzPts val="2000"/>
-              <a:buChar char="●"/>
-            </a:pPr>
-            <a:r>
-              <a:rPr lang="en-US" sz="2000"/>
-              <a:t>The finest level in the longest direction has 512 nodes.</a:t>
-            </a:r>
-            <a:endParaRPr sz="2000"/>
-          </a:p>
-          <a:p>
-            <a:pPr marL="457200" lvl="0" indent="-355600" algn="l" rtl="0">
-              <a:spcBef>
-                <a:spcPts val="1000"/>
-              </a:spcBef>
-              <a:spcAft>
-                <a:spcPts val="0"/>
-              </a:spcAft>
-              <a:buSzPts val="2000"/>
-              <a:buChar char="●"/>
-            </a:pPr>
-            <a:r>
-              <a:rPr lang="en-US" sz="2000"/>
-              <a:t>There are 3 levels with a 4:1 ratio of refinement each.</a:t>
-            </a:r>
-            <a:endParaRPr sz="2000"/>
-          </a:p>
-          <a:p>
-            <a:pPr marL="457200" lvl="0" indent="-355600" algn="l" rtl="0">
-              <a:spcBef>
-                <a:spcPts val="1000"/>
-              </a:spcBef>
-              <a:spcAft>
-                <a:spcPts val="0"/>
-              </a:spcAft>
-              <a:buSzPts val="2000"/>
-              <a:buChar char="●"/>
-            </a:pPr>
-            <a:r>
-              <a:rPr lang="en-US" sz="2000"/>
-              <a:t>This means the coarsest level in the longest direction has N = 512*(¼)^(3-1) = 32 nodes</a:t>
-            </a:r>
-            <a:endParaRPr sz="2000"/>
-          </a:p>
-          <a:p>
-            <a:pPr marL="457200" lvl="0" indent="-355600" algn="l" rtl="0">
-              <a:spcBef>
-                <a:spcPts val="1000"/>
-              </a:spcBef>
-              <a:spcAft>
-                <a:spcPts val="0"/>
-              </a:spcAft>
-              <a:buSzPts val="2000"/>
-              <a:buChar char="●"/>
-            </a:pPr>
-            <a:r>
-              <a:rPr lang="en-US" sz="2000"/>
-              <a:t>The coarsest level in the shorter directions have N/8 = 4 nodes.</a:t>
-            </a:r>
-            <a:endParaRPr sz="2000"/>
-          </a:p>
-          <a:p>
-            <a:pPr marL="457200" lvl="0" indent="-355600" algn="l" rtl="0">
-              <a:spcBef>
-                <a:spcPts val="1000"/>
-              </a:spcBef>
-              <a:spcAft>
-                <a:spcPts val="1000"/>
-              </a:spcAft>
-              <a:buSzPts val="2000"/>
-              <a:buChar char="●"/>
-            </a:pPr>
-            <a:r>
-              <a:rPr lang="en-US" sz="2000"/>
-              <a:t>In input3D:</a:t>
-            </a:r>
-            <a:endParaRPr sz="2000"/>
-          </a:p>
-        </p:txBody>
-      </p:sp>
-      <p:sp>
-        <p:nvSpPr>
-          <p:cNvPr id="259" name="Google Shape;259;p49"/>
-          <p:cNvSpPr txBox="1"/>
-          <p:nvPr/>
-        </p:nvSpPr>
-        <p:spPr>
-          <a:xfrm>
-            <a:off x="348490" y="3071860"/>
-            <a:ext cx="8649000" cy="3999900"/>
-          </a:xfrm>
-          <a:prstGeom prst="rect">
-            <a:avLst/>
-          </a:prstGeom>
-          <a:noFill/>
-          <a:ln>
-            <a:noFill/>
-          </a:ln>
-        </p:spPr>
-        <p:txBody>
-          <a:bodyPr spcFirstLastPara="1" wrap="square" lIns="91425" tIns="91425" rIns="91425" bIns="91425" anchor="ctr" anchorCtr="0">
-            <a:noAutofit/>
-          </a:bodyPr>
-          <a:lstStyle/>
-          <a:p>
-            <a:pPr marL="0" lvl="0" indent="0" algn="l" rtl="0">
-              <a:spcBef>
-                <a:spcPts val="0"/>
-              </a:spcBef>
-              <a:spcAft>
-                <a:spcPts val="0"/>
-              </a:spcAft>
-              <a:buNone/>
-            </a:pPr>
-            <a:r>
-              <a:rPr lang="en-US" sz="1200" dirty="0"/>
-              <a:t>N = 32                                     				// actual number of grid cells on coarsest grid in longest direction</a:t>
-            </a:r>
-            <a:endParaRPr sz="1200" dirty="0"/>
-          </a:p>
-          <a:p>
-            <a:pPr marL="0" lvl="0" indent="0" algn="l" rtl="0">
-              <a:spcBef>
-                <a:spcPts val="0"/>
-              </a:spcBef>
-              <a:spcAft>
-                <a:spcPts val="0"/>
-              </a:spcAft>
-              <a:buNone/>
-            </a:pPr>
-            <a:r>
-              <a:rPr lang="en-US" sz="1200" dirty="0"/>
-              <a:t>NFINEST = (REF_RATIO^(MAX_LEVELS - 1))*N  	// effective number of grid cells on finest grid in the longest direction</a:t>
-            </a:r>
-            <a:endParaRPr sz="1200" dirty="0"/>
-          </a:p>
-        </p:txBody>
-      </p:sp>
-    </p:spTree>
-    <p:extLst>
-      <p:ext uri="{BB962C8B-B14F-4D97-AF65-F5344CB8AC3E}">
-        <p14:creationId xmlns:p14="http://schemas.microsoft.com/office/powerpoint/2010/main" val="2338677629"/>
-      </p:ext>
-    </p:extLst>
-  </p:cSld>
-  <p:clrMapOvr>
-    <a:masterClrMapping/>
-  </p:clrMapOvr>
-</p:sld>
-</file>
-
-<file path=ppt/slides/slide21.xml><?xml version="1.0" encoding="utf-8"?>
-<p:sld xmlns:a="http://schemas.openxmlformats.org/drawingml/2006/main" xmlns:r="http://schemas.openxmlformats.org/officeDocument/2006/relationships" xmlns:p="http://schemas.openxmlformats.org/presentationml/2006/main">
-  <p:cSld>
-    <p:spTree>
-      <p:nvGrpSpPr>
-        <p:cNvPr id="1" name="Shape 263"/>
-        <p:cNvGrpSpPr/>
-        <p:nvPr/>
-      </p:nvGrpSpPr>
-      <p:grpSpPr>
-        <a:xfrm>
-          <a:off x="0" y="0"/>
-          <a:ext cx="0" cy="0"/>
-          <a:chOff x="0" y="0"/>
-          <a:chExt cx="0" cy="0"/>
-        </a:xfrm>
-      </p:grpSpPr>
-      <p:sp>
-        <p:nvSpPr>
-          <p:cNvPr id="264" name="Google Shape;264;p50"/>
-          <p:cNvSpPr txBox="1">
-            <a:spLocks noGrp="1"/>
-          </p:cNvSpPr>
-          <p:nvPr>
-            <p:ph type="title"/>
-          </p:nvPr>
-        </p:nvSpPr>
-        <p:spPr>
-          <a:xfrm>
-            <a:off x="457200" y="274638"/>
-            <a:ext cx="8229600" cy="1143300"/>
-          </a:xfrm>
-          <a:prstGeom prst="rect">
-            <a:avLst/>
-          </a:prstGeom>
-        </p:spPr>
-        <p:txBody>
-          <a:bodyPr spcFirstLastPara="1" wrap="square" lIns="91425" tIns="91425" rIns="91425" bIns="91425" anchor="b" anchorCtr="0">
-            <a:noAutofit/>
-          </a:bodyPr>
-          <a:lstStyle/>
-          <a:p>
-            <a:pPr marL="0" lvl="0" indent="0" algn="l" rtl="0">
-              <a:spcBef>
-                <a:spcPts val="0"/>
-              </a:spcBef>
-              <a:spcAft>
-                <a:spcPts val="0"/>
-              </a:spcAft>
-              <a:buNone/>
-            </a:pPr>
-            <a:r>
-              <a:rPr lang="en-US"/>
-              <a:t>AMR - Cartesian Geometry</a:t>
-            </a:r>
-            <a:endParaRPr/>
-          </a:p>
-        </p:txBody>
-      </p:sp>
-      <p:sp>
-        <p:nvSpPr>
-          <p:cNvPr id="265" name="Google Shape;265;p50"/>
-          <p:cNvSpPr txBox="1">
-            <a:spLocks noGrp="1"/>
-          </p:cNvSpPr>
-          <p:nvPr>
-            <p:ph type="body" idx="1"/>
-          </p:nvPr>
-        </p:nvSpPr>
-        <p:spPr>
-          <a:xfrm>
-            <a:off x="457200" y="1600200"/>
-            <a:ext cx="8229600" cy="4967700"/>
-          </a:xfrm>
-          <a:prstGeom prst="rect">
-            <a:avLst/>
-          </a:prstGeom>
-        </p:spPr>
-        <p:txBody>
-          <a:bodyPr spcFirstLastPara="1" wrap="square" lIns="91425" tIns="91425" rIns="91425" bIns="91425" anchor="t" anchorCtr="0">
-            <a:noAutofit/>
-          </a:bodyPr>
-          <a:lstStyle/>
-          <a:p>
-            <a:pPr marL="457200" lvl="0" indent="-381000" algn="l" rtl="0">
-              <a:spcBef>
-                <a:spcPts val="600"/>
-              </a:spcBef>
-              <a:spcAft>
-                <a:spcPts val="0"/>
-              </a:spcAft>
-              <a:buSzPts val="2400"/>
-              <a:buChar char="●"/>
-            </a:pPr>
-            <a:r>
-              <a:rPr lang="en-US" sz="2400"/>
-              <a:t>The domain boxes should go from 0 to M-1, where M is the number of nodes on the coarsest grid in that direction.</a:t>
-            </a:r>
-            <a:endParaRPr sz="2400"/>
-          </a:p>
-          <a:p>
-            <a:pPr marL="457200" lvl="0" indent="-381000" algn="l" rtl="0">
-              <a:spcBef>
-                <a:spcPts val="0"/>
-              </a:spcBef>
-              <a:spcAft>
-                <a:spcPts val="0"/>
-              </a:spcAft>
-              <a:buSzPts val="2400"/>
-              <a:buChar char="●"/>
-            </a:pPr>
-            <a:r>
-              <a:rPr lang="en-US" sz="2400"/>
-              <a:t>The upper and lower physical dimensions of the computational domain should also be declared here.</a:t>
-            </a:r>
-            <a:endParaRPr sz="2400"/>
-          </a:p>
-        </p:txBody>
-      </p:sp>
-      <p:sp>
-        <p:nvSpPr>
-          <p:cNvPr id="266" name="Google Shape;266;p50"/>
-          <p:cNvSpPr txBox="1"/>
-          <p:nvPr/>
-        </p:nvSpPr>
-        <p:spPr>
-          <a:xfrm>
-            <a:off x="841650" y="3644504"/>
-            <a:ext cx="7460700" cy="2663100"/>
-          </a:xfrm>
-          <a:prstGeom prst="rect">
-            <a:avLst/>
-          </a:prstGeom>
-          <a:noFill/>
-          <a:ln>
-            <a:noFill/>
-          </a:ln>
-        </p:spPr>
-        <p:txBody>
-          <a:bodyPr spcFirstLastPara="1" wrap="square" lIns="91425" tIns="91425" rIns="91425" bIns="91425" anchor="ctr" anchorCtr="0">
-            <a:noAutofit/>
-          </a:bodyPr>
-          <a:lstStyle/>
-          <a:p>
-            <a:pPr marL="0" lvl="0" indent="0" algn="l" rtl="0">
-              <a:spcBef>
-                <a:spcPts val="0"/>
-              </a:spcBef>
-              <a:spcAft>
-                <a:spcPts val="0"/>
-              </a:spcAft>
-              <a:buNone/>
-            </a:pPr>
-            <a:r>
-              <a:rPr lang="en-US" dirty="0" err="1"/>
-              <a:t>CartesianGeometry</a:t>
-            </a:r>
-            <a:r>
-              <a:rPr lang="en-US" dirty="0"/>
-              <a:t> {                //</a:t>
-            </a:r>
-            <a:endParaRPr dirty="0"/>
-          </a:p>
-          <a:p>
-            <a:pPr marL="0" lvl="0" indent="0" algn="l" rtl="0">
-              <a:spcBef>
-                <a:spcPts val="0"/>
-              </a:spcBef>
-              <a:spcAft>
-                <a:spcPts val="0"/>
-              </a:spcAft>
-              <a:buNone/>
-            </a:pPr>
-            <a:r>
-              <a:rPr lang="en-US" dirty="0"/>
-              <a:t>   </a:t>
-            </a:r>
-            <a:r>
-              <a:rPr lang="en-US" dirty="0" err="1"/>
-              <a:t>domain_boxes</a:t>
-            </a:r>
-            <a:r>
-              <a:rPr lang="en-US" dirty="0"/>
-              <a:t> = [ (0,0,0) , (N/8 - 1,N/8 - 1,N - 1) ]//</a:t>
-            </a:r>
-            <a:endParaRPr dirty="0"/>
-          </a:p>
-          <a:p>
-            <a:pPr marL="0" lvl="0" indent="0" algn="l" rtl="0">
-              <a:spcBef>
-                <a:spcPts val="0"/>
-              </a:spcBef>
-              <a:spcAft>
-                <a:spcPts val="0"/>
-              </a:spcAft>
-              <a:buNone/>
-            </a:pPr>
-            <a:r>
-              <a:rPr lang="en-US" dirty="0"/>
-              <a:t>   </a:t>
-            </a:r>
-            <a:r>
-              <a:rPr lang="en-US" dirty="0" err="1"/>
-              <a:t>x_lo</a:t>
-            </a:r>
-            <a:r>
-              <a:rPr lang="en-US" dirty="0"/>
-              <a:t> = -L/16, -L/16, -L/2   // lower end of computational domain.</a:t>
-            </a:r>
-            <a:endParaRPr dirty="0"/>
-          </a:p>
-          <a:p>
-            <a:pPr marL="0" lvl="0" indent="0" algn="l" rtl="0">
-              <a:spcBef>
-                <a:spcPts val="0"/>
-              </a:spcBef>
-              <a:spcAft>
-                <a:spcPts val="0"/>
-              </a:spcAft>
-              <a:buNone/>
-            </a:pPr>
-            <a:r>
-              <a:rPr lang="en-US" dirty="0"/>
-              <a:t>   </a:t>
-            </a:r>
-            <a:r>
-              <a:rPr lang="en-US" dirty="0" err="1"/>
-              <a:t>x_up</a:t>
-            </a:r>
-            <a:r>
-              <a:rPr lang="en-US" dirty="0"/>
-              <a:t> =  L/16,  L/16, L/2  // upper end of computational domain.</a:t>
-            </a:r>
-            <a:endParaRPr dirty="0"/>
-          </a:p>
-          <a:p>
-            <a:pPr marL="0" lvl="0" indent="0" algn="l" rtl="0">
-              <a:spcBef>
-                <a:spcPts val="0"/>
-              </a:spcBef>
-              <a:spcAft>
-                <a:spcPts val="0"/>
-              </a:spcAft>
-              <a:buNone/>
-            </a:pPr>
-            <a:r>
-              <a:rPr lang="en-US" dirty="0"/>
-              <a:t>   </a:t>
-            </a:r>
-            <a:r>
-              <a:rPr lang="en-US" dirty="0" err="1"/>
-              <a:t>periodic_dimension</a:t>
-            </a:r>
-            <a:r>
-              <a:rPr lang="en-US" dirty="0"/>
-              <a:t> = 1, 1, 0               //</a:t>
-            </a:r>
-            <a:endParaRPr dirty="0"/>
-          </a:p>
-          <a:p>
-            <a:pPr marL="0" lvl="0" indent="0" algn="l" rtl="0">
-              <a:spcBef>
-                <a:spcPts val="0"/>
-              </a:spcBef>
-              <a:spcAft>
-                <a:spcPts val="0"/>
-              </a:spcAft>
-              <a:buNone/>
-            </a:pPr>
-            <a:r>
-              <a:rPr lang="en-US" dirty="0"/>
-              <a:t>} //</a:t>
-            </a:r>
-            <a:endParaRPr dirty="0"/>
-          </a:p>
-        </p:txBody>
-      </p:sp>
-    </p:spTree>
-    <p:extLst>
-      <p:ext uri="{BB962C8B-B14F-4D97-AF65-F5344CB8AC3E}">
-        <p14:creationId xmlns:p14="http://schemas.microsoft.com/office/powerpoint/2010/main" val="3047381586"/>
-      </p:ext>
-    </p:extLst>
-  </p:cSld>
-  <p:clrMapOvr>
-    <a:masterClrMapping/>
-  </p:clrMapOvr>
-</p:sld>
-</file>
-
-<file path=ppt/slides/slide22.xml><?xml version="1.0" encoding="utf-8"?>
-<p:sld xmlns:a="http://schemas.openxmlformats.org/drawingml/2006/main" xmlns:r="http://schemas.openxmlformats.org/officeDocument/2006/relationships" xmlns:p="http://schemas.openxmlformats.org/presentationml/2006/main">
-  <p:cSld>
-    <p:spTree>
-      <p:nvGrpSpPr>
-        <p:cNvPr id="1" name="Shape 270"/>
-        <p:cNvGrpSpPr/>
-        <p:nvPr/>
-      </p:nvGrpSpPr>
-      <p:grpSpPr>
-        <a:xfrm>
-          <a:off x="0" y="0"/>
-          <a:ext cx="0" cy="0"/>
-          <a:chOff x="0" y="0"/>
-          <a:chExt cx="0" cy="0"/>
-        </a:xfrm>
-      </p:grpSpPr>
-      <p:sp>
-        <p:nvSpPr>
-          <p:cNvPr id="271" name="Google Shape;271;p51"/>
-          <p:cNvSpPr txBox="1">
-            <a:spLocks noGrp="1"/>
-          </p:cNvSpPr>
-          <p:nvPr>
-            <p:ph type="title"/>
-          </p:nvPr>
-        </p:nvSpPr>
-        <p:spPr>
-          <a:xfrm>
-            <a:off x="457200" y="274638"/>
-            <a:ext cx="8229600" cy="1143300"/>
-          </a:xfrm>
-          <a:prstGeom prst="rect">
-            <a:avLst/>
-          </a:prstGeom>
-        </p:spPr>
-        <p:txBody>
-          <a:bodyPr spcFirstLastPara="1" wrap="square" lIns="91425" tIns="91425" rIns="91425" bIns="91425" anchor="b" anchorCtr="0">
-            <a:noAutofit/>
-          </a:bodyPr>
-          <a:lstStyle/>
-          <a:p>
-            <a:pPr marL="0" lvl="0" indent="0" algn="l" rtl="0">
-              <a:spcBef>
-                <a:spcPts val="0"/>
-              </a:spcBef>
-              <a:spcAft>
-                <a:spcPts val="0"/>
-              </a:spcAft>
-              <a:buNone/>
-            </a:pPr>
-            <a:r>
-              <a:rPr lang="en-US"/>
-              <a:t>Patch sizes</a:t>
-            </a:r>
-            <a:endParaRPr/>
-          </a:p>
-        </p:txBody>
-      </p:sp>
-      <p:sp>
-        <p:nvSpPr>
-          <p:cNvPr id="272" name="Google Shape;272;p51"/>
-          <p:cNvSpPr txBox="1">
-            <a:spLocks noGrp="1"/>
-          </p:cNvSpPr>
-          <p:nvPr>
-            <p:ph type="body" idx="1"/>
-          </p:nvPr>
-        </p:nvSpPr>
-        <p:spPr>
-          <a:xfrm>
-            <a:off x="457200" y="1295400"/>
-            <a:ext cx="8229600" cy="4967700"/>
-          </a:xfrm>
-          <a:prstGeom prst="rect">
-            <a:avLst/>
-          </a:prstGeom>
-        </p:spPr>
-        <p:txBody>
-          <a:bodyPr spcFirstLastPara="1" wrap="square" lIns="91425" tIns="91425" rIns="91425" bIns="91425" anchor="t" anchorCtr="0">
-            <a:noAutofit/>
-          </a:bodyPr>
-          <a:lstStyle/>
-          <a:p>
-            <a:pPr marL="457200" lvl="0" indent="-381000" algn="l" rtl="0">
-              <a:spcBef>
-                <a:spcPts val="600"/>
-              </a:spcBef>
-              <a:spcAft>
-                <a:spcPts val="0"/>
-              </a:spcAft>
-              <a:buSzPts val="2400"/>
-              <a:buChar char="●"/>
-            </a:pPr>
-            <a:r>
-              <a:rPr lang="en-US" sz="2400"/>
-              <a:t>The largest patch size should be a cube of the finest grid that fills the domain in the shortest direction(s).</a:t>
-            </a:r>
-            <a:endParaRPr sz="2400"/>
-          </a:p>
-          <a:p>
-            <a:pPr marL="457200" lvl="0" indent="-381000" algn="l" rtl="0">
-              <a:spcBef>
-                <a:spcPts val="0"/>
-              </a:spcBef>
-              <a:spcAft>
-                <a:spcPts val="0"/>
-              </a:spcAft>
-              <a:buSzPts val="2400"/>
-              <a:buChar char="●"/>
-            </a:pPr>
-            <a:r>
-              <a:rPr lang="en-US" sz="2400"/>
-              <a:t>The smallest patch size should be a cube of the coarsest grid that fills the domain in the shortest directions.</a:t>
-            </a:r>
-            <a:endParaRPr sz="2400"/>
-          </a:p>
-        </p:txBody>
-      </p:sp>
-      <p:sp>
-        <p:nvSpPr>
-          <p:cNvPr id="273" name="Google Shape;273;p51"/>
-          <p:cNvSpPr txBox="1"/>
-          <p:nvPr/>
-        </p:nvSpPr>
-        <p:spPr>
-          <a:xfrm>
-            <a:off x="646176" y="3162433"/>
-            <a:ext cx="8329500" cy="3289200"/>
-          </a:xfrm>
-          <a:prstGeom prst="rect">
-            <a:avLst/>
-          </a:prstGeom>
-          <a:noFill/>
-          <a:ln>
-            <a:noFill/>
-          </a:ln>
-        </p:spPr>
-        <p:txBody>
-          <a:bodyPr spcFirstLastPara="1" wrap="square" lIns="91425" tIns="91425" rIns="91425" bIns="91425" anchor="ctr" anchorCtr="0">
-            <a:noAutofit/>
-          </a:bodyPr>
-          <a:lstStyle/>
-          <a:p>
-            <a:pPr marL="0" lvl="0" indent="0" algn="l" rtl="0">
-              <a:spcBef>
-                <a:spcPts val="0"/>
-              </a:spcBef>
-              <a:spcAft>
-                <a:spcPts val="0"/>
-              </a:spcAft>
-              <a:buNone/>
-            </a:pPr>
-            <a:r>
-              <a:rPr lang="en-US" dirty="0"/>
-              <a:t>   </a:t>
-            </a:r>
-            <a:r>
-              <a:rPr lang="en-US" dirty="0" err="1"/>
-              <a:t>largest_patch_size</a:t>
-            </a:r>
-            <a:r>
-              <a:rPr lang="en-US" dirty="0"/>
-              <a:t> {                //</a:t>
-            </a:r>
-            <a:endParaRPr dirty="0"/>
-          </a:p>
-          <a:p>
-            <a:pPr marL="0" lvl="0" indent="0" algn="l" rtl="0">
-              <a:spcBef>
-                <a:spcPts val="0"/>
-              </a:spcBef>
-              <a:spcAft>
-                <a:spcPts val="0"/>
-              </a:spcAft>
-              <a:buNone/>
-            </a:pPr>
-            <a:r>
-              <a:rPr lang="en-US" dirty="0"/>
-              <a:t>      level_0 = NFINEST/8, NFINEST/8, NFINEST/8  // largest patch allowed in hierarchy</a:t>
-            </a:r>
-            <a:endParaRPr dirty="0"/>
-          </a:p>
-          <a:p>
-            <a:pPr marL="0" lvl="0" indent="0" algn="l" rtl="0">
-              <a:spcBef>
-                <a:spcPts val="0"/>
-              </a:spcBef>
-              <a:spcAft>
-                <a:spcPts val="0"/>
-              </a:spcAft>
-              <a:buNone/>
-            </a:pPr>
-            <a:r>
-              <a:rPr lang="en-US" dirty="0"/>
-              <a:t>                                  // NOTE: all finer levels will use same values as level_0...</a:t>
-            </a:r>
-            <a:endParaRPr dirty="0"/>
-          </a:p>
-          <a:p>
-            <a:pPr marL="0" lvl="0" indent="0" algn="l" rtl="0">
-              <a:spcBef>
-                <a:spcPts val="0"/>
-              </a:spcBef>
-              <a:spcAft>
-                <a:spcPts val="0"/>
-              </a:spcAft>
-              <a:buNone/>
-            </a:pPr>
-            <a:r>
-              <a:rPr lang="en-US" dirty="0"/>
-              <a:t>   } //</a:t>
-            </a:r>
-            <a:endParaRPr dirty="0"/>
-          </a:p>
-          <a:p>
-            <a:pPr marL="0" lvl="0" indent="0" algn="l" rtl="0">
-              <a:spcBef>
-                <a:spcPts val="0"/>
-              </a:spcBef>
-              <a:spcAft>
-                <a:spcPts val="0"/>
-              </a:spcAft>
-              <a:buNone/>
-            </a:pPr>
-            <a:r>
-              <a:rPr lang="en-US" dirty="0"/>
-              <a:t>//</a:t>
-            </a:r>
-            <a:endParaRPr dirty="0"/>
-          </a:p>
-          <a:p>
-            <a:pPr marL="0" lvl="0" indent="0" algn="l" rtl="0">
-              <a:spcBef>
-                <a:spcPts val="0"/>
-              </a:spcBef>
-              <a:spcAft>
-                <a:spcPts val="0"/>
-              </a:spcAft>
-              <a:buNone/>
-            </a:pPr>
-            <a:r>
-              <a:rPr lang="en-US" dirty="0"/>
-              <a:t>   </a:t>
-            </a:r>
-            <a:r>
-              <a:rPr lang="en-US" dirty="0" err="1"/>
-              <a:t>smallest_patch_size</a:t>
-            </a:r>
-            <a:r>
-              <a:rPr lang="en-US" dirty="0"/>
-              <a:t> {                //</a:t>
-            </a:r>
-            <a:endParaRPr dirty="0"/>
-          </a:p>
-          <a:p>
-            <a:pPr marL="0" lvl="0" indent="0" algn="l" rtl="0">
-              <a:spcBef>
-                <a:spcPts val="0"/>
-              </a:spcBef>
-              <a:spcAft>
-                <a:spcPts val="0"/>
-              </a:spcAft>
-              <a:buNone/>
-            </a:pPr>
-            <a:r>
-              <a:rPr lang="en-US" dirty="0"/>
-              <a:t>      level_0 = 4, 4, 4              // smallest patch allowed in hierarchy</a:t>
-            </a:r>
-            <a:endParaRPr dirty="0"/>
-          </a:p>
-          <a:p>
-            <a:pPr marL="0" lvl="0" indent="0" algn="l" rtl="0">
-              <a:spcBef>
-                <a:spcPts val="0"/>
-              </a:spcBef>
-              <a:spcAft>
-                <a:spcPts val="0"/>
-              </a:spcAft>
-              <a:buNone/>
-            </a:pPr>
-            <a:r>
-              <a:rPr lang="en-US" dirty="0"/>
-              <a:t>                                  // NOTE: all finer levels will use same values as level_0...</a:t>
-            </a:r>
-            <a:endParaRPr dirty="0"/>
-          </a:p>
-          <a:p>
-            <a:pPr marL="0" lvl="0" indent="0" algn="l" rtl="0">
-              <a:spcBef>
-                <a:spcPts val="0"/>
-              </a:spcBef>
-              <a:spcAft>
-                <a:spcPts val="0"/>
-              </a:spcAft>
-              <a:buNone/>
-            </a:pPr>
-            <a:r>
-              <a:rPr lang="en-US" dirty="0"/>
-              <a:t>   }                //</a:t>
-            </a:r>
-            <a:endParaRPr dirty="0"/>
-          </a:p>
-        </p:txBody>
-      </p:sp>
-    </p:spTree>
-    <p:extLst>
-      <p:ext uri="{BB962C8B-B14F-4D97-AF65-F5344CB8AC3E}">
-        <p14:creationId xmlns:p14="http://schemas.microsoft.com/office/powerpoint/2010/main" val="2717359942"/>
-      </p:ext>
-    </p:extLst>
-  </p:cSld>
-  <p:clrMapOvr>
-    <a:masterClrMapping/>
-  </p:clrMapOvr>
-</p:sld>
-</file>
-
-<file path=ppt/slides/slide23.xml><?xml version="1.0" encoding="utf-8"?>
-<p:sld xmlns:a="http://schemas.openxmlformats.org/drawingml/2006/main" xmlns:r="http://schemas.openxmlformats.org/officeDocument/2006/relationships" xmlns:p="http://schemas.openxmlformats.org/presentationml/2006/main">
-  <p:cSld>
-    <p:spTree>
-      <p:nvGrpSpPr>
-        <p:cNvPr id="1" name="Shape 277"/>
-        <p:cNvGrpSpPr/>
-        <p:nvPr/>
-      </p:nvGrpSpPr>
-      <p:grpSpPr>
-        <a:xfrm>
-          <a:off x="0" y="0"/>
-          <a:ext cx="0" cy="0"/>
-          <a:chOff x="0" y="0"/>
-          <a:chExt cx="0" cy="0"/>
-        </a:xfrm>
-      </p:grpSpPr>
-      <p:sp>
-        <p:nvSpPr>
-          <p:cNvPr id="278" name="Google Shape;278;p52"/>
-          <p:cNvSpPr txBox="1">
-            <a:spLocks noGrp="1"/>
-          </p:cNvSpPr>
-          <p:nvPr>
-            <p:ph type="title"/>
-          </p:nvPr>
-        </p:nvSpPr>
-        <p:spPr>
-          <a:xfrm>
-            <a:off x="457200" y="274638"/>
-            <a:ext cx="8229600" cy="1143300"/>
-          </a:xfrm>
-          <a:prstGeom prst="rect">
-            <a:avLst/>
-          </a:prstGeom>
-        </p:spPr>
-        <p:txBody>
-          <a:bodyPr spcFirstLastPara="1" wrap="square" lIns="91425" tIns="91425" rIns="91425" bIns="91425" anchor="b" anchorCtr="0">
-            <a:noAutofit/>
-          </a:bodyPr>
-          <a:lstStyle/>
-          <a:p>
-            <a:pPr marL="0" lvl="0" indent="0" algn="l" rtl="0">
-              <a:spcBef>
-                <a:spcPts val="0"/>
-              </a:spcBef>
-              <a:spcAft>
-                <a:spcPts val="0"/>
-              </a:spcAft>
-              <a:buNone/>
-            </a:pPr>
-            <a:r>
-              <a:rPr lang="en-US"/>
-              <a:t>Summary</a:t>
-            </a:r>
-            <a:endParaRPr/>
-          </a:p>
-        </p:txBody>
-      </p:sp>
-      <p:sp>
-        <p:nvSpPr>
-          <p:cNvPr id="279" name="Google Shape;279;p52"/>
-          <p:cNvSpPr txBox="1">
-            <a:spLocks noGrp="1"/>
-          </p:cNvSpPr>
-          <p:nvPr>
-            <p:ph type="body" idx="1"/>
-          </p:nvPr>
-        </p:nvSpPr>
-        <p:spPr>
-          <a:xfrm>
-            <a:off x="457200" y="1600200"/>
-            <a:ext cx="8229600" cy="4967700"/>
-          </a:xfrm>
-          <a:prstGeom prst="rect">
-            <a:avLst/>
-          </a:prstGeom>
-        </p:spPr>
-        <p:txBody>
-          <a:bodyPr spcFirstLastPara="1" wrap="square" lIns="91425" tIns="91425" rIns="91425" bIns="91425" anchor="t" anchorCtr="0">
-            <a:noAutofit/>
-          </a:bodyPr>
-          <a:lstStyle/>
-          <a:p>
-            <a:pPr marL="457200" lvl="0" indent="-381000" algn="l" rtl="0">
-              <a:spcBef>
-                <a:spcPts val="600"/>
-              </a:spcBef>
-              <a:spcAft>
-                <a:spcPts val="0"/>
-              </a:spcAft>
-              <a:buSzPts val="2400"/>
-              <a:buChar char="●"/>
-            </a:pPr>
-            <a:r>
-              <a:rPr lang="en-US" sz="2400"/>
-              <a:t>You need to make sure that each of the dimensions are such that they are evenly divisible by (refinement_ratio)^(number_levels-1).</a:t>
-            </a:r>
-            <a:endParaRPr sz="2400"/>
-          </a:p>
-          <a:p>
-            <a:pPr marL="457200" lvl="0" indent="-381000" algn="l" rtl="0">
-              <a:spcBef>
-                <a:spcPts val="1000"/>
-              </a:spcBef>
-              <a:spcAft>
-                <a:spcPts val="0"/>
-              </a:spcAft>
-              <a:buSzPts val="2400"/>
-              <a:buChar char="●"/>
-            </a:pPr>
-            <a:r>
-              <a:rPr lang="en-US" sz="2400"/>
-              <a:t>Also make sure you don’t have a coarsest level of size 1 (or even 2) in any dimension.</a:t>
-            </a:r>
-            <a:endParaRPr sz="2400"/>
-          </a:p>
-          <a:p>
-            <a:pPr marL="457200" lvl="0" indent="-381000" algn="l" rtl="0">
-              <a:spcBef>
-                <a:spcPts val="1000"/>
-              </a:spcBef>
-              <a:spcAft>
-                <a:spcPts val="1000"/>
-              </a:spcAft>
-              <a:buSzPts val="2400"/>
-              <a:buChar char="●"/>
-            </a:pPr>
-            <a:r>
-              <a:rPr lang="en-US" sz="2400"/>
-              <a:t>You need to tell IBAMR how it will make the different levels of refinement. What are the bounds on the largest and smallest levels?</a:t>
-            </a:r>
-            <a:endParaRPr sz="2400"/>
-          </a:p>
-        </p:txBody>
-      </p:sp>
-    </p:spTree>
-    <p:extLst>
-      <p:ext uri="{BB962C8B-B14F-4D97-AF65-F5344CB8AC3E}">
-        <p14:creationId xmlns:p14="http://schemas.microsoft.com/office/powerpoint/2010/main" val="692089669"/>
-      </p:ext>
-    </p:extLst>
-  </p:cSld>
-  <p:clrMapOvr>
-    <a:masterClrMapping/>
-  </p:clrMapOvr>
-</p:sld>
-</file>
-
-<file path=ppt/slides/slide3.xml><?xml version="1.0" encoding="utf-8"?>
+<file path=ppt/slides/slide4.xml><?xml version="1.0" encoding="utf-8"?>
 <p:sld xmlns:a="http://schemas.openxmlformats.org/drawingml/2006/main" xmlns:r="http://schemas.openxmlformats.org/officeDocument/2006/relationships" xmlns:p="http://schemas.openxmlformats.org/presentationml/2006/main">
   <p:cSld>
     <p:spTree>
@@ -23446,7 +23804,7 @@
 </p:sld>
 </file>
 
-<file path=ppt/slides/slide4.xml><?xml version="1.0" encoding="utf-8"?>
+<file path=ppt/slides/slide5.xml><?xml version="1.0" encoding="utf-8"?>
 <p:sld xmlns:a="http://schemas.openxmlformats.org/drawingml/2006/main" xmlns:r="http://schemas.openxmlformats.org/officeDocument/2006/relationships" xmlns:p="http://schemas.openxmlformats.org/presentationml/2006/main">
   <p:cSld>
     <p:spTree>
@@ -23789,7 +24147,7 @@
 </p:sld>
 </file>
 
-<file path=ppt/slides/slide5.xml><?xml version="1.0" encoding="utf-8"?>
+<file path=ppt/slides/slide6.xml><?xml version="1.0" encoding="utf-8"?>
 <p:sld xmlns:a="http://schemas.openxmlformats.org/drawingml/2006/main" xmlns:r="http://schemas.openxmlformats.org/officeDocument/2006/relationships" xmlns:p="http://schemas.openxmlformats.org/presentationml/2006/main">
   <p:cSld>
     <p:spTree>
@@ -24181,7 +24539,7 @@
 </p:sld>
 </file>
 
-<file path=ppt/slides/slide6.xml><?xml version="1.0" encoding="utf-8"?>
+<file path=ppt/slides/slide7.xml><?xml version="1.0" encoding="utf-8"?>
 <p:sld xmlns:a="http://schemas.openxmlformats.org/drawingml/2006/main" xmlns:r="http://schemas.openxmlformats.org/officeDocument/2006/relationships" xmlns:p="http://schemas.openxmlformats.org/presentationml/2006/main">
   <p:cSld>
     <p:spTree>
@@ -24784,7 +25142,7 @@
 </p:sld>
 </file>
 
-<file path=ppt/slides/slide7.xml><?xml version="1.0" encoding="utf-8"?>
+<file path=ppt/slides/slide8.xml><?xml version="1.0" encoding="utf-8"?>
 <p:sld xmlns:a="http://schemas.openxmlformats.org/drawingml/2006/main" xmlns:r="http://schemas.openxmlformats.org/officeDocument/2006/relationships" xmlns:p="http://schemas.openxmlformats.org/presentationml/2006/main">
   <p:cSld>
     <p:spTree>
@@ -25491,7 +25849,7 @@
 </p:sld>
 </file>
 
-<file path=ppt/slides/slide8.xml><?xml version="1.0" encoding="utf-8"?>
+<file path=ppt/slides/slide9.xml><?xml version="1.0" encoding="utf-8"?>
 <p:sld xmlns:a="http://schemas.openxmlformats.org/drawingml/2006/main" xmlns:r="http://schemas.openxmlformats.org/officeDocument/2006/relationships" xmlns:p="http://schemas.openxmlformats.org/presentationml/2006/main">
   <p:cSld>
     <p:spTree>
@@ -25755,7 +26113,7 @@
               <a:buSzPts val="1700"/>
             </a:pPr>
             <a:r>
-              <a:rPr lang="en" dirty="0" smtClean="0"/>
+              <a:rPr lang="en" dirty="0"/>
               <a:t>Look on github under examples</a:t>
             </a:r>
           </a:p>
@@ -25764,7 +26122,7 @@
               <a:buSzPts val="1700"/>
             </a:pPr>
             <a:r>
-              <a:rPr lang="en-US" dirty="0" smtClean="0"/>
+              <a:rPr lang="en-US" dirty="0"/>
               <a:t>4-Example_2DTetheredBeam</a:t>
             </a:r>
             <a:endParaRPr sz="1400" b="0" i="0" u="none" strike="noStrike" cap="none" dirty="0">
@@ -25776,212 +26134,6 @@
               <a:cs typeface="Calibri"/>
               <a:sym typeface="Calibri"/>
             </a:endParaRPr>
-          </a:p>
-        </p:txBody>
-      </p:sp>
-    </p:spTree>
-  </p:cSld>
-  <p:clrMapOvr>
-    <a:masterClrMapping/>
-  </p:clrMapOvr>
-</p:sld>
-</file>
-
-<file path=ppt/slides/slide9.xml><?xml version="1.0" encoding="utf-8"?>
-<p:sld xmlns:a="http://schemas.openxmlformats.org/drawingml/2006/main" xmlns:r="http://schemas.openxmlformats.org/officeDocument/2006/relationships" xmlns:p="http://schemas.openxmlformats.org/presentationml/2006/main">
-  <p:cSld>
-    <p:spTree>
-      <p:nvGrpSpPr>
-        <p:cNvPr id="1" name="Shape 163"/>
-        <p:cNvGrpSpPr/>
-        <p:nvPr/>
-      </p:nvGrpSpPr>
-      <p:grpSpPr>
-        <a:xfrm>
-          <a:off x="0" y="0"/>
-          <a:ext cx="0" cy="0"/>
-          <a:chOff x="0" y="0"/>
-          <a:chExt cx="0" cy="0"/>
-        </a:xfrm>
-      </p:grpSpPr>
-      <p:sp>
-        <p:nvSpPr>
-          <p:cNvPr id="164" name="Google Shape;164;p40"/>
-          <p:cNvSpPr txBox="1">
-            <a:spLocks noGrp="1"/>
-          </p:cNvSpPr>
-          <p:nvPr>
-            <p:ph type="title"/>
-          </p:nvPr>
-        </p:nvSpPr>
-        <p:spPr>
-          <a:xfrm>
-            <a:off x="457200" y="274637"/>
-            <a:ext cx="8229600" cy="1143000"/>
-          </a:xfrm>
-          <a:prstGeom prst="rect">
-            <a:avLst/>
-          </a:prstGeom>
-        </p:spPr>
-        <p:txBody>
-          <a:bodyPr spcFirstLastPara="1" wrap="square" lIns="91425" tIns="91425" rIns="91425" bIns="91425" anchor="t" anchorCtr="0">
-            <a:noAutofit/>
-          </a:bodyPr>
-          <a:lstStyle/>
-          <a:p>
-            <a:pPr marL="0" lvl="0" indent="0" algn="ctr" rtl="0">
-              <a:spcBef>
-                <a:spcPts val="0"/>
-              </a:spcBef>
-              <a:spcAft>
-                <a:spcPts val="0"/>
-              </a:spcAft>
-              <a:buNone/>
-            </a:pPr>
-            <a:r>
-              <a:rPr lang="en"/>
-              <a:t>Spatially and Time-Dependent Boundary Conditions</a:t>
-            </a:r>
-            <a:endParaRPr/>
-          </a:p>
-        </p:txBody>
-      </p:sp>
-      <p:sp>
-        <p:nvSpPr>
-          <p:cNvPr id="165" name="Google Shape;165;p40"/>
-          <p:cNvSpPr txBox="1">
-            <a:spLocks noGrp="1"/>
-          </p:cNvSpPr>
-          <p:nvPr>
-            <p:ph type="body" idx="1"/>
-          </p:nvPr>
-        </p:nvSpPr>
-        <p:spPr>
-          <a:xfrm>
-            <a:off x="457200" y="1706800"/>
-            <a:ext cx="8229600" cy="4526100"/>
-          </a:xfrm>
-          <a:prstGeom prst="rect">
-            <a:avLst/>
-          </a:prstGeom>
-        </p:spPr>
-        <p:txBody>
-          <a:bodyPr spcFirstLastPara="1" wrap="square" lIns="91425" tIns="91425" rIns="91425" bIns="91425" anchor="t" anchorCtr="0">
-            <a:noAutofit/>
-          </a:bodyPr>
-          <a:lstStyle/>
-          <a:p>
-            <a:pPr lvl="0"/>
-            <a:r>
-              <a:rPr lang="en" dirty="0" smtClean="0"/>
-              <a:t>Look at </a:t>
-            </a:r>
-            <a:r>
-              <a:rPr lang="en-US" dirty="0"/>
-              <a:t>4-Example_2DPulsatileChannelFlow</a:t>
-            </a:r>
-            <a:endParaRPr lang="en" dirty="0"/>
-          </a:p>
-          <a:p>
-            <a:pPr marL="457200" lvl="0" indent="-317500" algn="l" rtl="0">
-              <a:spcBef>
-                <a:spcPts val="640"/>
-              </a:spcBef>
-              <a:spcAft>
-                <a:spcPts val="0"/>
-              </a:spcAft>
-              <a:buSzPts val="1400"/>
-              <a:buChar char="●"/>
-            </a:pPr>
-            <a:r>
-              <a:rPr lang="en" dirty="0" smtClean="0"/>
-              <a:t>IBAMR </a:t>
-            </a:r>
-            <a:r>
-              <a:rPr lang="en" dirty="0"/>
-              <a:t>is capable of time-dependent and spatially dependent boundary conditions.</a:t>
-            </a:r>
-            <a:endParaRPr dirty="0"/>
-          </a:p>
-          <a:p>
-            <a:pPr marL="914400" lvl="1" indent="-317500" algn="l" rtl="0">
-              <a:lnSpc>
-                <a:spcPct val="115000"/>
-              </a:lnSpc>
-              <a:spcBef>
-                <a:spcPts val="0"/>
-              </a:spcBef>
-              <a:spcAft>
-                <a:spcPts val="0"/>
-              </a:spcAft>
-              <a:buSzPts val="1400"/>
-              <a:buChar char="○"/>
-            </a:pPr>
-            <a:r>
-              <a:rPr lang="en" dirty="0"/>
-              <a:t>In ‘input2d’: under VelocityBcCoefs_0(or 1) { //</a:t>
-            </a:r>
-            <a:endParaRPr dirty="0"/>
-          </a:p>
-          <a:p>
-            <a:pPr marL="1371600" lvl="2" indent="-317500" algn="l" rtl="0">
-              <a:lnSpc>
-                <a:spcPct val="115000"/>
-              </a:lnSpc>
-              <a:spcBef>
-                <a:spcPts val="0"/>
-              </a:spcBef>
-              <a:spcAft>
-                <a:spcPts val="0"/>
-              </a:spcAft>
-              <a:buSzPts val="1400"/>
-              <a:buChar char="■"/>
-            </a:pPr>
-            <a:r>
-              <a:rPr lang="en" dirty="0"/>
-              <a:t>In any of the coefficients, you can use the variable ‘t’ for any time-dependence</a:t>
-            </a:r>
-            <a:endParaRPr dirty="0"/>
-          </a:p>
-          <a:p>
-            <a:pPr marL="1371600" lvl="2" indent="-317500" algn="l" rtl="0">
-              <a:lnSpc>
-                <a:spcPct val="115000"/>
-              </a:lnSpc>
-              <a:spcBef>
-                <a:spcPts val="0"/>
-              </a:spcBef>
-              <a:spcAft>
-                <a:spcPts val="0"/>
-              </a:spcAft>
-              <a:buSzPts val="1400"/>
-              <a:buChar char="■"/>
-            </a:pPr>
-            <a:r>
-              <a:rPr lang="en" dirty="0"/>
-              <a:t>You can use X_0, X_1, or X_2 for x,y or z respectively.</a:t>
-            </a:r>
-            <a:endParaRPr dirty="0"/>
-          </a:p>
-          <a:p>
-            <a:pPr marL="1371600" lvl="2" indent="-317500" algn="l" rtl="0">
-              <a:lnSpc>
-                <a:spcPct val="115000"/>
-              </a:lnSpc>
-              <a:spcBef>
-                <a:spcPts val="0"/>
-              </a:spcBef>
-              <a:spcAft>
-                <a:spcPts val="0"/>
-              </a:spcAft>
-              <a:buSzPts val="1400"/>
-              <a:buChar char="■"/>
-            </a:pPr>
-            <a:r>
-              <a:rPr lang="en" dirty="0"/>
-              <a:t>You can use inline “if-statements” for specifying boundary conditions like “if x is less than 5, then u = 2, else u = 0” </a:t>
-            </a:r>
-            <a:endParaRPr dirty="0"/>
           </a:p>
         </p:txBody>
       </p:sp>

</xml_diff>

<commit_message>
added tethered beam to UA examples
</commit_message>
<xml_diff>
--- a/IBAMR Lectures/Lecture 4 - IBAMR Tutorial_ Boundary Conditions.pptx
+++ b/IBAMR Lectures/Lecture 4 - IBAMR Tutorial_ Boundary Conditions.pptx
@@ -20363,9 +20363,47 @@
             </a:pPr>
             <a:r>
               <a:rPr lang="en-US" sz="2400" dirty="0"/>
-              <a:t>Look at Example_3DGlycocalyx.zip in the examples folder.</a:t>
+              <a:t>Look at 4-Example_3DGlycocalyx on </a:t>
             </a:r>
-            <a:endParaRPr sz="2400" dirty="0"/>
+            <a:r>
+              <a:rPr lang="en-US" sz="2400" dirty="0" err="1"/>
+              <a:t>Github</a:t>
+            </a:r>
+            <a:r>
+              <a:rPr lang="en-US" sz="2400" dirty="0"/>
+              <a:t>.</a:t>
+            </a:r>
+          </a:p>
+          <a:p>
+            <a:pPr lvl="1">
+              <a:spcBef>
+                <a:spcPts val="600"/>
+              </a:spcBef>
+              <a:buFont typeface="Calibri"/>
+              <a:buChar char="●"/>
+            </a:pPr>
+            <a:r>
+              <a:rPr lang="en-US" sz="1400" dirty="0">
+                <a:effectLst/>
+                <a:latin typeface="Helvetica" pitchFamily="2" charset="0"/>
+              </a:rPr>
+              <a:t>https://</a:t>
+            </a:r>
+            <a:r>
+              <a:rPr lang="en-US" sz="1400" dirty="0" err="1">
+                <a:effectLst/>
+                <a:latin typeface="Helvetica" pitchFamily="2" charset="0"/>
+              </a:rPr>
+              <a:t>github.com</a:t>
+            </a:r>
+            <a:r>
+              <a:rPr lang="en-US" sz="1400" dirty="0">
+                <a:effectLst/>
+                <a:latin typeface="Helvetica" pitchFamily="2" charset="0"/>
+              </a:rPr>
+              <a:t>/fairyflies9/IBAMR-Tutorials/tree/master/Examples/UA-Examples/4-Example_3DGlycocalyx</a:t>
+            </a:r>
+            <a:endParaRPr sz="2000" dirty="0"/>
           </a:p>
           <a:p>
             <a:pPr marL="457200" lvl="0" indent="-381000" algn="l" rtl="0">

</xml_diff>